<commit_message>
adding pdf slides for today and new reading
</commit_message>
<xml_diff>
--- a/slides/jan_26.pptx
+++ b/slides/jan_26.pptx
@@ -5,40 +5,42 @@
     <p:sldMasterId id="2147483650" r:id="rId1"/>
   </p:sldMasterIdLst>
   <p:notesMasterIdLst>
-    <p:notesMasterId r:id="rId33"/>
+    <p:notesMasterId r:id="rId35"/>
   </p:notesMasterIdLst>
   <p:sldIdLst>
     <p:sldId id="278" r:id="rId2"/>
     <p:sldId id="279" r:id="rId3"/>
     <p:sldId id="308" r:id="rId4"/>
     <p:sldId id="294" r:id="rId5"/>
-    <p:sldId id="295" r:id="rId6"/>
-    <p:sldId id="281" r:id="rId7"/>
-    <p:sldId id="296" r:id="rId8"/>
-    <p:sldId id="297" r:id="rId9"/>
-    <p:sldId id="299" r:id="rId10"/>
-    <p:sldId id="309" r:id="rId11"/>
-    <p:sldId id="310" r:id="rId12"/>
-    <p:sldId id="311" r:id="rId13"/>
-    <p:sldId id="312" r:id="rId14"/>
-    <p:sldId id="313" r:id="rId15"/>
-    <p:sldId id="314" r:id="rId16"/>
-    <p:sldId id="315" r:id="rId17"/>
-    <p:sldId id="316" r:id="rId18"/>
-    <p:sldId id="306" r:id="rId19"/>
-    <p:sldId id="317" r:id="rId20"/>
-    <p:sldId id="283" r:id="rId21"/>
-    <p:sldId id="300" r:id="rId22"/>
-    <p:sldId id="301" r:id="rId23"/>
-    <p:sldId id="302" r:id="rId24"/>
-    <p:sldId id="303" r:id="rId25"/>
-    <p:sldId id="304" r:id="rId26"/>
-    <p:sldId id="305" r:id="rId27"/>
-    <p:sldId id="318" r:id="rId28"/>
-    <p:sldId id="319" r:id="rId29"/>
-    <p:sldId id="320" r:id="rId30"/>
-    <p:sldId id="321" r:id="rId31"/>
-    <p:sldId id="322" r:id="rId32"/>
+    <p:sldId id="323" r:id="rId6"/>
+    <p:sldId id="324" r:id="rId7"/>
+    <p:sldId id="295" r:id="rId8"/>
+    <p:sldId id="281" r:id="rId9"/>
+    <p:sldId id="296" r:id="rId10"/>
+    <p:sldId id="297" r:id="rId11"/>
+    <p:sldId id="299" r:id="rId12"/>
+    <p:sldId id="309" r:id="rId13"/>
+    <p:sldId id="310" r:id="rId14"/>
+    <p:sldId id="311" r:id="rId15"/>
+    <p:sldId id="312" r:id="rId16"/>
+    <p:sldId id="313" r:id="rId17"/>
+    <p:sldId id="314" r:id="rId18"/>
+    <p:sldId id="315" r:id="rId19"/>
+    <p:sldId id="316" r:id="rId20"/>
+    <p:sldId id="306" r:id="rId21"/>
+    <p:sldId id="317" r:id="rId22"/>
+    <p:sldId id="283" r:id="rId23"/>
+    <p:sldId id="300" r:id="rId24"/>
+    <p:sldId id="301" r:id="rId25"/>
+    <p:sldId id="302" r:id="rId26"/>
+    <p:sldId id="303" r:id="rId27"/>
+    <p:sldId id="304" r:id="rId28"/>
+    <p:sldId id="305" r:id="rId29"/>
+    <p:sldId id="318" r:id="rId30"/>
+    <p:sldId id="319" r:id="rId31"/>
+    <p:sldId id="320" r:id="rId32"/>
+    <p:sldId id="321" r:id="rId33"/>
+    <p:sldId id="322" r:id="rId34"/>
   </p:sldIdLst>
   <p:sldSz cx="12192000" cy="6858000"/>
   <p:notesSz cx="13716000" cy="24384000"/>
@@ -28785,7 +28787,7 @@
           <a:p>
             <a:r>
               <a:rPr lang="en-US" dirty="0"/>
-              <a:t>Jan 26, 2023</a:t>
+              <a:t>Jan 27, 2023</a:t>
             </a:r>
           </a:p>
         </p:txBody>
@@ -28804,6 +28806,302 @@
 </file>
 
 <file path=ppt/slides/slide10.xml><?xml version="1.0" encoding="utf-8"?>
+<p:sld xmlns:a="http://schemas.openxmlformats.org/drawingml/2006/main" xmlns:r="http://schemas.openxmlformats.org/officeDocument/2006/relationships" xmlns:p="http://schemas.openxmlformats.org/presentationml/2006/main">
+  <p:cSld>
+    <p:spTree>
+      <p:nvGrpSpPr>
+        <p:cNvPr id="1" name=""/>
+        <p:cNvGrpSpPr/>
+        <p:nvPr/>
+      </p:nvGrpSpPr>
+      <p:grpSpPr>
+        <a:xfrm>
+          <a:off x="0" y="0"/>
+          <a:ext cx="0" cy="0"/>
+          <a:chOff x="0" y="0"/>
+          <a:chExt cx="0" cy="0"/>
+        </a:xfrm>
+      </p:grpSpPr>
+      <p:sp>
+        <p:nvSpPr>
+          <p:cNvPr id="4" name="Title 3">
+            <a:extLst>
+              <a:ext uri="{FF2B5EF4-FFF2-40B4-BE49-F238E27FC236}">
+                <a16:creationId xmlns:a16="http://schemas.microsoft.com/office/drawing/2014/main" id="{72E69214-67DA-08BF-FF1B-366786C63065}"/>
+              </a:ext>
+            </a:extLst>
+          </p:cNvPr>
+          <p:cNvSpPr>
+            <a:spLocks noGrp="1"/>
+          </p:cNvSpPr>
+          <p:nvPr>
+            <p:ph type="title"/>
+          </p:nvPr>
+        </p:nvSpPr>
+        <p:spPr/>
+        <p:txBody>
+          <a:bodyPr/>
+          <a:lstStyle/>
+          <a:p>
+            <a:r>
+              <a:rPr lang="en-US" dirty="0"/>
+              <a:t>Charles Osgood </a:t>
+            </a:r>
+            <a:br>
+              <a:rPr lang="en-US" dirty="0"/>
+            </a:br>
+            <a:r>
+              <a:rPr lang="en-US" dirty="0"/>
+              <a:t>Semantic Differentials</a:t>
+            </a:r>
+          </a:p>
+        </p:txBody>
+      </p:sp>
+      <p:pic>
+        <p:nvPicPr>
+          <p:cNvPr id="1026" name="Picture 2" descr="Semantic differential(어의차이척도법, 의미척도법)">
+            <a:extLst>
+              <a:ext uri="{FF2B5EF4-FFF2-40B4-BE49-F238E27FC236}">
+                <a16:creationId xmlns:a16="http://schemas.microsoft.com/office/drawing/2014/main" id="{5A7D0992-5725-7052-F221-2B6AD787BA03}"/>
+              </a:ext>
+            </a:extLst>
+          </p:cNvPr>
+          <p:cNvPicPr>
+            <a:picLocks noGrp="1" noChangeAspect="1" noChangeArrowheads="1"/>
+          </p:cNvPicPr>
+          <p:nvPr>
+            <p:ph sz="half" idx="1"/>
+          </p:nvPr>
+        </p:nvPicPr>
+        <p:blipFill>
+          <a:blip r:embed="rId3">
+            <a:extLst>
+              <a:ext uri="{28A0092B-C50C-407E-A947-70E740481C1C}">
+                <a14:useLocalDpi xmlns:a14="http://schemas.microsoft.com/office/drawing/2010/main" val="0"/>
+              </a:ext>
+            </a:extLst>
+          </a:blip>
+          <a:srcRect/>
+          <a:stretch>
+            <a:fillRect/>
+          </a:stretch>
+        </p:blipFill>
+        <p:spPr bwMode="auto">
+          <a:xfrm>
+            <a:off x="4457700" y="2913172"/>
+            <a:ext cx="3193999" cy="3416191"/>
+          </a:xfrm>
+          <a:prstGeom prst="rect">
+            <a:avLst/>
+          </a:prstGeom>
+          <a:noFill/>
+          <a:extLst>
+            <a:ext uri="{909E8E84-426E-40DD-AFC4-6F175D3DCCD1}">
+              <a14:hiddenFill xmlns:a14="http://schemas.microsoft.com/office/drawing/2010/main">
+                <a:solidFill>
+                  <a:srgbClr val="FFFFFF"/>
+                </a:solidFill>
+              </a14:hiddenFill>
+            </a:ext>
+          </a:extLst>
+        </p:spPr>
+      </p:pic>
+    </p:spTree>
+    <p:extLst>
+      <p:ext uri="{BB962C8B-B14F-4D97-AF65-F5344CB8AC3E}">
+        <p14:creationId xmlns:p14="http://schemas.microsoft.com/office/powerpoint/2010/main" val="1654984753"/>
+      </p:ext>
+    </p:extLst>
+  </p:cSld>
+  <p:clrMapOvr>
+    <a:masterClrMapping/>
+  </p:clrMapOvr>
+</p:sld>
+</file>
+
+<file path=ppt/slides/slide11.xml><?xml version="1.0" encoding="utf-8"?>
+<p:sld xmlns:a="http://schemas.openxmlformats.org/drawingml/2006/main" xmlns:r="http://schemas.openxmlformats.org/officeDocument/2006/relationships" xmlns:p="http://schemas.openxmlformats.org/presentationml/2006/main">
+  <p:cSld>
+    <p:spTree>
+      <p:nvGrpSpPr>
+        <p:cNvPr id="1" name=""/>
+        <p:cNvGrpSpPr/>
+        <p:nvPr/>
+      </p:nvGrpSpPr>
+      <p:grpSpPr>
+        <a:xfrm>
+          <a:off x="0" y="0"/>
+          <a:ext cx="0" cy="0"/>
+          <a:chOff x="0" y="0"/>
+          <a:chExt cx="0" cy="0"/>
+        </a:xfrm>
+      </p:grpSpPr>
+      <p:sp>
+        <p:nvSpPr>
+          <p:cNvPr id="6" name="Title 5">
+            <a:extLst>
+              <a:ext uri="{FF2B5EF4-FFF2-40B4-BE49-F238E27FC236}">
+                <a16:creationId xmlns:a16="http://schemas.microsoft.com/office/drawing/2014/main" id="{003198B1-54BB-06D0-A959-E34200185E31}"/>
+              </a:ext>
+            </a:extLst>
+          </p:cNvPr>
+          <p:cNvSpPr>
+            <a:spLocks noGrp="1"/>
+          </p:cNvSpPr>
+          <p:nvPr>
+            <p:ph type="title"/>
+          </p:nvPr>
+        </p:nvSpPr>
+        <p:spPr>
+          <a:xfrm>
+            <a:off x="758952" y="1216152"/>
+            <a:ext cx="10671048" cy="768096"/>
+          </a:xfrm>
+        </p:spPr>
+        <p:txBody>
+          <a:bodyPr anchor="t">
+            <a:normAutofit/>
+          </a:bodyPr>
+          <a:lstStyle/>
+          <a:p>
+            <a:r>
+              <a:rPr lang="en-US" dirty="0"/>
+              <a:t>Measuring Meaning</a:t>
+            </a:r>
+          </a:p>
+        </p:txBody>
+      </p:sp>
+      <p:sp>
+        <p:nvSpPr>
+          <p:cNvPr id="4" name="Footer Placeholder 3">
+            <a:extLst>
+              <a:ext uri="{FF2B5EF4-FFF2-40B4-BE49-F238E27FC236}">
+                <a16:creationId xmlns:a16="http://schemas.microsoft.com/office/drawing/2014/main" id="{064C92B0-7E52-5F3D-2CB5-65C78F3CA34A}"/>
+              </a:ext>
+            </a:extLst>
+          </p:cNvPr>
+          <p:cNvSpPr>
+            <a:spLocks noGrp="1"/>
+          </p:cNvSpPr>
+          <p:nvPr>
+            <p:ph type="ftr" sz="quarter" idx="11"/>
+          </p:nvPr>
+        </p:nvSpPr>
+        <p:spPr>
+          <a:xfrm>
+            <a:off x="621792" y="457200"/>
+            <a:ext cx="3200400" cy="274320"/>
+          </a:xfrm>
+        </p:spPr>
+        <p:txBody>
+          <a:bodyPr anchor="ctr">
+            <a:normAutofit/>
+          </a:bodyPr>
+          <a:lstStyle/>
+          <a:p>
+            <a:pPr>
+              <a:spcAft>
+                <a:spcPts val="600"/>
+              </a:spcAft>
+            </a:pPr>
+            <a:r>
+              <a:rPr lang="en-US" dirty="0"/>
+              <a:t>Affect Control Theory: Sentiments</a:t>
+            </a:r>
+          </a:p>
+        </p:txBody>
+      </p:sp>
+      <p:sp>
+        <p:nvSpPr>
+          <p:cNvPr id="5" name="Slide Number Placeholder 4">
+            <a:extLst>
+              <a:ext uri="{FF2B5EF4-FFF2-40B4-BE49-F238E27FC236}">
+                <a16:creationId xmlns:a16="http://schemas.microsoft.com/office/drawing/2014/main" id="{855AD2D8-1A1B-EF6C-43CE-B6A8AFF35963}"/>
+              </a:ext>
+            </a:extLst>
+          </p:cNvPr>
+          <p:cNvSpPr>
+            <a:spLocks noGrp="1"/>
+          </p:cNvSpPr>
+          <p:nvPr>
+            <p:ph type="sldNum" sz="quarter" idx="12"/>
+          </p:nvPr>
+        </p:nvSpPr>
+        <p:spPr>
+          <a:xfrm>
+            <a:off x="10945368" y="457200"/>
+            <a:ext cx="987552" cy="274320"/>
+          </a:xfrm>
+        </p:spPr>
+        <p:txBody>
+          <a:bodyPr anchor="ctr">
+            <a:normAutofit/>
+          </a:bodyPr>
+          <a:lstStyle/>
+          <a:p>
+            <a:pPr>
+              <a:spcAft>
+                <a:spcPts val="600"/>
+              </a:spcAft>
+            </a:pPr>
+            <a:fld id="{48F63A3B-78C7-47BE-AE5E-E10140E04643}" type="slidenum">
+              <a:rPr lang="en-US" smtClean="0"/>
+              <a:pPr>
+                <a:spcAft>
+                  <a:spcPts val="600"/>
+                </a:spcAft>
+              </a:pPr>
+              <a:t>11</a:t>
+            </a:fld>
+            <a:endParaRPr lang="en-US"/>
+          </a:p>
+        </p:txBody>
+      </p:sp>
+      <p:graphicFrame>
+        <p:nvGraphicFramePr>
+          <p:cNvPr id="9" name="Content Placeholder 6">
+            <a:extLst>
+              <a:ext uri="{FF2B5EF4-FFF2-40B4-BE49-F238E27FC236}">
+                <a16:creationId xmlns:a16="http://schemas.microsoft.com/office/drawing/2014/main" id="{7043C111-30BB-1943-610E-F121CF066942}"/>
+              </a:ext>
+            </a:extLst>
+          </p:cNvPr>
+          <p:cNvGraphicFramePr>
+            <a:graphicFrameLocks noGrp="1"/>
+          </p:cNvGraphicFramePr>
+          <p:nvPr>
+            <p:ph sz="half" idx="1"/>
+            <p:extLst>
+              <p:ext uri="{D42A27DB-BD31-4B8C-83A1-F6EECF244321}">
+                <p14:modId xmlns:p14="http://schemas.microsoft.com/office/powerpoint/2010/main" val="1186906416"/>
+              </p:ext>
+            </p:extLst>
+          </p:nvPr>
+        </p:nvGraphicFramePr>
+        <p:xfrm>
+          <a:off x="539496" y="2103120"/>
+          <a:ext cx="11119104" cy="4434840"/>
+        </p:xfrm>
+        <a:graphic>
+          <a:graphicData uri="http://schemas.openxmlformats.org/drawingml/2006/diagram">
+            <dgm:relIds xmlns:dgm="http://schemas.openxmlformats.org/drawingml/2006/diagram" xmlns:r="http://schemas.openxmlformats.org/officeDocument/2006/relationships" r:dm="rId2" r:lo="rId3" r:qs="rId4" r:cs="rId5"/>
+          </a:graphicData>
+        </a:graphic>
+      </p:graphicFrame>
+    </p:spTree>
+    <p:extLst>
+      <p:ext uri="{BB962C8B-B14F-4D97-AF65-F5344CB8AC3E}">
+        <p14:creationId xmlns:p14="http://schemas.microsoft.com/office/powerpoint/2010/main" val="4052890704"/>
+      </p:ext>
+    </p:extLst>
+  </p:cSld>
+  <p:clrMapOvr>
+    <a:masterClrMapping/>
+  </p:clrMapOvr>
+</p:sld>
+</file>
+
+<file path=ppt/slides/slide12.xml><?xml version="1.0" encoding="utf-8"?>
 <p:sld xmlns:a="http://schemas.openxmlformats.org/drawingml/2006/main" xmlns:r="http://schemas.openxmlformats.org/officeDocument/2006/relationships" xmlns:p="http://schemas.openxmlformats.org/presentationml/2006/main">
   <p:cSld>
     <p:spTree>
@@ -28864,7 +29162,7 @@
             <p:ph sz="half" idx="1"/>
             <p:extLst>
               <p:ext uri="{D42A27DB-BD31-4B8C-83A1-F6EECF244321}">
-                <p14:modId xmlns:p14="http://schemas.microsoft.com/office/powerpoint/2010/main" val="4178853497"/>
+                <p14:modId xmlns:p14="http://schemas.microsoft.com/office/powerpoint/2010/main" val="3000178231"/>
               </p:ext>
             </p:extLst>
           </p:nvPr>
@@ -28975,7 +29273,7 @@
                     <a:lstStyle/>
                     <a:p>
                       <a:r>
-                        <a:rPr lang="en-US" dirty="0"/>
+                        <a:rPr lang="en-US" b="1" dirty="0"/>
                         <a:t>High</a:t>
                       </a:r>
                     </a:p>
@@ -28988,7 +29286,7 @@
                     <a:lstStyle/>
                     <a:p>
                       <a:r>
-                        <a:rPr lang="en-US" dirty="0"/>
+                        <a:rPr lang="en-US" b="1" dirty="0"/>
                         <a:t>High</a:t>
                       </a:r>
                     </a:p>
@@ -29001,7 +29299,7 @@
                     <a:lstStyle/>
                     <a:p>
                       <a:r>
-                        <a:rPr lang="en-US" dirty="0"/>
+                        <a:rPr lang="en-US" b="1" dirty="0"/>
                         <a:t>High </a:t>
                       </a:r>
                     </a:p>
@@ -29014,13 +29312,13 @@
                     <a:lstStyle/>
                     <a:p>
                       <a:r>
-                        <a:rPr lang="en-US" dirty="0"/>
+                        <a:rPr lang="en-US" b="1" dirty="0"/>
                         <a:t>Firefighter, </a:t>
                       </a:r>
                     </a:p>
                     <a:p>
                       <a:r>
-                        <a:rPr lang="en-US" dirty="0"/>
+                        <a:rPr lang="en-US" b="1" dirty="0"/>
                         <a:t>Winner, brain</a:t>
                       </a:r>
                     </a:p>
@@ -29642,7 +29940,7 @@
           <a:p>
             <a:fld id="{48F63A3B-78C7-47BE-AE5E-E10140E04643}" type="slidenum">
               <a:rPr lang="en-US" smtClean="0"/>
-              <a:t>10</a:t>
+              <a:t>12</a:t>
             </a:fld>
             <a:endParaRPr lang="en-US" dirty="0"/>
           </a:p>
@@ -29661,7 +29959,7 @@
 </p:sld>
 </file>
 
-<file path=ppt/slides/slide11.xml><?xml version="1.0" encoding="utf-8"?>
+<file path=ppt/slides/slide13.xml><?xml version="1.0" encoding="utf-8"?>
 <p:sld xmlns:a="http://schemas.openxmlformats.org/drawingml/2006/main" xmlns:r="http://schemas.openxmlformats.org/officeDocument/2006/relationships" xmlns:p="http://schemas.openxmlformats.org/presentationml/2006/main">
   <p:cSld>
     <p:spTree>
@@ -29722,7 +30020,7 @@
             <p:ph sz="half" idx="1"/>
             <p:extLst>
               <p:ext uri="{D42A27DB-BD31-4B8C-83A1-F6EECF244321}">
-                <p14:modId xmlns:p14="http://schemas.microsoft.com/office/powerpoint/2010/main" val="2851029154"/>
+                <p14:modId xmlns:p14="http://schemas.microsoft.com/office/powerpoint/2010/main" val="2156762017"/>
               </p:ext>
             </p:extLst>
           </p:nvPr>
@@ -29889,7 +30187,7 @@
                     <a:lstStyle/>
                     <a:p>
                       <a:r>
-                        <a:rPr lang="en-US" dirty="0"/>
+                        <a:rPr lang="en-US" b="1" dirty="0"/>
                         <a:t>High</a:t>
                       </a:r>
                     </a:p>
@@ -29902,7 +30200,7 @@
                     <a:lstStyle/>
                     <a:p>
                       <a:r>
-                        <a:rPr lang="en-US" dirty="0"/>
+                        <a:rPr lang="en-US" b="1" dirty="0"/>
                         <a:t>High</a:t>
                       </a:r>
                     </a:p>
@@ -29915,7 +30213,7 @@
                     <a:lstStyle/>
                     <a:p>
                       <a:r>
-                        <a:rPr lang="en-US" dirty="0"/>
+                        <a:rPr lang="en-US" b="1" dirty="0"/>
                         <a:t>Low</a:t>
                       </a:r>
                     </a:p>
@@ -29928,13 +30226,13 @@
                     <a:lstStyle/>
                     <a:p>
                       <a:r>
-                        <a:rPr lang="en-US" dirty="0"/>
+                        <a:rPr lang="en-US" b="1" dirty="0"/>
                         <a:t>Grandparent,</a:t>
                       </a:r>
                     </a:p>
                     <a:p>
                       <a:r>
-                        <a:rPr lang="en-US" dirty="0"/>
+                        <a:rPr lang="en-US" b="1" dirty="0"/>
                         <a:t>writer</a:t>
                       </a:r>
                     </a:p>
@@ -30500,7 +30798,7 @@
           <a:p>
             <a:fld id="{48F63A3B-78C7-47BE-AE5E-E10140E04643}" type="slidenum">
               <a:rPr lang="en-US" smtClean="0"/>
-              <a:t>11</a:t>
+              <a:t>13</a:t>
             </a:fld>
             <a:endParaRPr lang="en-US" dirty="0"/>
           </a:p>
@@ -30519,7 +30817,7 @@
 </p:sld>
 </file>
 
-<file path=ppt/slides/slide12.xml><?xml version="1.0" encoding="utf-8"?>
+<file path=ppt/slides/slide14.xml><?xml version="1.0" encoding="utf-8"?>
 <p:sld xmlns:a="http://schemas.openxmlformats.org/drawingml/2006/main" xmlns:r="http://schemas.openxmlformats.org/officeDocument/2006/relationships" xmlns:p="http://schemas.openxmlformats.org/presentationml/2006/main">
   <p:cSld>
     <p:spTree>
@@ -30580,7 +30878,7 @@
             <p:ph sz="half" idx="1"/>
             <p:extLst>
               <p:ext uri="{D42A27DB-BD31-4B8C-83A1-F6EECF244321}">
-                <p14:modId xmlns:p14="http://schemas.microsoft.com/office/powerpoint/2010/main" val="3892597918"/>
+                <p14:modId xmlns:p14="http://schemas.microsoft.com/office/powerpoint/2010/main" val="3653704692"/>
               </p:ext>
             </p:extLst>
           </p:nvPr>
@@ -30803,7 +31101,7 @@
                     <a:lstStyle/>
                     <a:p>
                       <a:r>
-                        <a:rPr lang="en-US" dirty="0"/>
+                        <a:rPr lang="en-US" b="1" dirty="0"/>
                         <a:t>High</a:t>
                       </a:r>
                     </a:p>
@@ -30816,7 +31114,7 @@
                     <a:lstStyle/>
                     <a:p>
                       <a:r>
-                        <a:rPr lang="en-US" dirty="0"/>
+                        <a:rPr lang="en-US" b="1" dirty="0"/>
                         <a:t>Low</a:t>
                       </a:r>
                     </a:p>
@@ -30829,7 +31127,7 @@
                     <a:lstStyle/>
                     <a:p>
                       <a:r>
-                        <a:rPr lang="en-US" dirty="0"/>
+                        <a:rPr lang="en-US" b="1" dirty="0"/>
                         <a:t>High </a:t>
                       </a:r>
                     </a:p>
@@ -30842,13 +31140,13 @@
                     <a:lstStyle/>
                     <a:p>
                       <a:r>
-                        <a:rPr lang="en-US" dirty="0"/>
+                        <a:rPr lang="en-US" b="1" dirty="0"/>
                         <a:t>Baby, toddler, </a:t>
                       </a:r>
                     </a:p>
                     <a:p>
                       <a:r>
-                        <a:rPr lang="en-US" dirty="0"/>
+                        <a:rPr lang="en-US" b="1" dirty="0"/>
                         <a:t>Infant, child</a:t>
                       </a:r>
                     </a:p>
@@ -31358,7 +31656,7 @@
           <a:p>
             <a:fld id="{48F63A3B-78C7-47BE-AE5E-E10140E04643}" type="slidenum">
               <a:rPr lang="en-US" smtClean="0"/>
-              <a:t>12</a:t>
+              <a:t>14</a:t>
             </a:fld>
             <a:endParaRPr lang="en-US" dirty="0"/>
           </a:p>
@@ -31377,7 +31675,7 @@
 </p:sld>
 </file>
 
-<file path=ppt/slides/slide13.xml><?xml version="1.0" encoding="utf-8"?>
+<file path=ppt/slides/slide15.xml><?xml version="1.0" encoding="utf-8"?>
 <p:sld xmlns:a="http://schemas.openxmlformats.org/drawingml/2006/main" xmlns:r="http://schemas.openxmlformats.org/officeDocument/2006/relationships" xmlns:p="http://schemas.openxmlformats.org/presentationml/2006/main">
   <p:cSld>
     <p:spTree>
@@ -31438,7 +31736,7 @@
             <p:ph sz="half" idx="1"/>
             <p:extLst>
               <p:ext uri="{D42A27DB-BD31-4B8C-83A1-F6EECF244321}">
-                <p14:modId xmlns:p14="http://schemas.microsoft.com/office/powerpoint/2010/main" val="3619948264"/>
+                <p14:modId xmlns:p14="http://schemas.microsoft.com/office/powerpoint/2010/main" val="2449310679"/>
               </p:ext>
             </p:extLst>
           </p:nvPr>
@@ -31717,7 +32015,7 @@
                     <a:lstStyle/>
                     <a:p>
                       <a:r>
-                        <a:rPr lang="en-US" dirty="0"/>
+                        <a:rPr lang="en-US" b="1" dirty="0"/>
                         <a:t>High</a:t>
                       </a:r>
                     </a:p>
@@ -31730,7 +32028,7 @@
                     <a:lstStyle/>
                     <a:p>
                       <a:r>
-                        <a:rPr lang="en-US" dirty="0"/>
+                        <a:rPr lang="en-US" b="1" dirty="0"/>
                         <a:t>Low</a:t>
                       </a:r>
                     </a:p>
@@ -31743,7 +32041,7 @@
                     <a:lstStyle/>
                     <a:p>
                       <a:r>
-                        <a:rPr lang="en-US" dirty="0"/>
+                        <a:rPr lang="en-US" b="1" dirty="0"/>
                         <a:t>Low</a:t>
                       </a:r>
                     </a:p>
@@ -31756,7 +32054,7 @@
                     <a:lstStyle/>
                     <a:p>
                       <a:r>
-                        <a:rPr lang="en-US" dirty="0"/>
+                        <a:rPr lang="en-US" b="1" dirty="0"/>
                         <a:t>Shrimp, doll</a:t>
                       </a:r>
                     </a:p>
@@ -32210,7 +32508,7 @@
           <a:p>
             <a:fld id="{48F63A3B-78C7-47BE-AE5E-E10140E04643}" type="slidenum">
               <a:rPr lang="en-US" smtClean="0"/>
-              <a:t>13</a:t>
+              <a:t>15</a:t>
             </a:fld>
             <a:endParaRPr lang="en-US" dirty="0"/>
           </a:p>
@@ -32229,7 +32527,7 @@
 </p:sld>
 </file>
 
-<file path=ppt/slides/slide14.xml><?xml version="1.0" encoding="utf-8"?>
+<file path=ppt/slides/slide16.xml><?xml version="1.0" encoding="utf-8"?>
 <p:sld xmlns:a="http://schemas.openxmlformats.org/drawingml/2006/main" xmlns:r="http://schemas.openxmlformats.org/officeDocument/2006/relationships" xmlns:p="http://schemas.openxmlformats.org/presentationml/2006/main">
   <p:cSld>
     <p:spTree>
@@ -32290,7 +32588,7 @@
             <p:ph sz="half" idx="1"/>
             <p:extLst>
               <p:ext uri="{D42A27DB-BD31-4B8C-83A1-F6EECF244321}">
-                <p14:modId xmlns:p14="http://schemas.microsoft.com/office/powerpoint/2010/main" val="3817194729"/>
+                <p14:modId xmlns:p14="http://schemas.microsoft.com/office/powerpoint/2010/main" val="3820362560"/>
               </p:ext>
             </p:extLst>
           </p:nvPr>
@@ -32642,7 +32940,7 @@
                         <a:defRPr/>
                       </a:pPr>
                       <a:r>
-                        <a:rPr kumimoji="0" lang="en-US" sz="1800" b="0" i="0" u="none" strike="noStrike" kern="1200" cap="none" spc="0" normalizeH="0" baseline="0" noProof="0">
+                        <a:rPr kumimoji="0" lang="en-US" sz="1800" b="1" i="0" u="none" strike="noStrike" kern="1200" cap="none" spc="0" normalizeH="0" baseline="0" noProof="0">
                           <a:ln>
                             <a:noFill/>
                           </a:ln>
@@ -32658,7 +32956,7 @@
                         </a:rPr>
                         <a:t>Low</a:t>
                       </a:r>
-                      <a:endParaRPr kumimoji="0" lang="en-US" sz="1800" b="0" i="0" u="none" strike="noStrike" kern="1200" cap="none" spc="0" normalizeH="0" baseline="0" noProof="0" dirty="0">
+                      <a:endParaRPr kumimoji="0" lang="en-US" sz="1800" b="1" i="0" u="none" strike="noStrike" kern="1200" cap="none" spc="0" normalizeH="0" baseline="0" noProof="0" dirty="0">
                         <a:ln>
                           <a:noFill/>
                         </a:ln>
@@ -32682,7 +32980,7 @@
                     <a:lstStyle/>
                     <a:p>
                       <a:r>
-                        <a:rPr lang="en-US" dirty="0"/>
+                        <a:rPr lang="en-US" b="1" dirty="0"/>
                         <a:t>High </a:t>
                       </a:r>
                     </a:p>
@@ -32695,7 +32993,7 @@
                     <a:lstStyle/>
                     <a:p>
                       <a:r>
-                        <a:rPr lang="en-US" dirty="0"/>
+                        <a:rPr lang="en-US" b="1" dirty="0"/>
                         <a:t>High </a:t>
                       </a:r>
                     </a:p>
@@ -32708,7 +33006,7 @@
                     <a:lstStyle/>
                     <a:p>
                       <a:r>
-                        <a:rPr lang="en-US" dirty="0"/>
+                        <a:rPr lang="en-US" b="1" dirty="0"/>
                         <a:t>Mobster, gangster, pimp</a:t>
                       </a:r>
                     </a:p>
@@ -33062,7 +33360,7 @@
           <a:p>
             <a:fld id="{48F63A3B-78C7-47BE-AE5E-E10140E04643}" type="slidenum">
               <a:rPr lang="en-US" smtClean="0"/>
-              <a:t>14</a:t>
+              <a:t>16</a:t>
             </a:fld>
             <a:endParaRPr lang="en-US" dirty="0"/>
           </a:p>
@@ -33081,7 +33379,7 @@
 </p:sld>
 </file>
 
-<file path=ppt/slides/slide15.xml><?xml version="1.0" encoding="utf-8"?>
+<file path=ppt/slides/slide17.xml><?xml version="1.0" encoding="utf-8"?>
 <p:sld xmlns:a="http://schemas.openxmlformats.org/drawingml/2006/main" xmlns:r="http://schemas.openxmlformats.org/officeDocument/2006/relationships" xmlns:p="http://schemas.openxmlformats.org/presentationml/2006/main">
   <p:cSld>
     <p:spTree>
@@ -33142,7 +33440,7 @@
             <p:ph sz="half" idx="1"/>
             <p:extLst>
               <p:ext uri="{D42A27DB-BD31-4B8C-83A1-F6EECF244321}">
-                <p14:modId xmlns:p14="http://schemas.microsoft.com/office/powerpoint/2010/main" val="724192270"/>
+                <p14:modId xmlns:p14="http://schemas.microsoft.com/office/powerpoint/2010/main" val="3002129233"/>
               </p:ext>
             </p:extLst>
           </p:nvPr>
@@ -33694,7 +33992,7 @@
                         <a:defRPr/>
                       </a:pPr>
                       <a:r>
-                        <a:rPr kumimoji="0" lang="en-US" sz="1800" b="0" i="0" u="none" strike="noStrike" kern="1200" cap="none" spc="0" normalizeH="0" baseline="0" noProof="0">
+                        <a:rPr kumimoji="0" lang="en-US" sz="1800" b="1" i="0" u="none" strike="noStrike" kern="1200" cap="none" spc="0" normalizeH="0" baseline="0" noProof="0">
                           <a:ln>
                             <a:noFill/>
                           </a:ln>
@@ -33710,7 +34008,7 @@
                         </a:rPr>
                         <a:t>Low</a:t>
                       </a:r>
-                      <a:endParaRPr kumimoji="0" lang="en-US" sz="1800" b="0" i="0" u="none" strike="noStrike" kern="1200" cap="none" spc="0" normalizeH="0" baseline="0" noProof="0" dirty="0">
+                      <a:endParaRPr kumimoji="0" lang="en-US" sz="1800" b="1" i="0" u="none" strike="noStrike" kern="1200" cap="none" spc="0" normalizeH="0" baseline="0" noProof="0" dirty="0">
                         <a:ln>
                           <a:noFill/>
                         </a:ln>
@@ -33734,7 +34032,7 @@
                     <a:lstStyle/>
                     <a:p>
                       <a:r>
-                        <a:rPr lang="en-US" dirty="0"/>
+                        <a:rPr lang="en-US" b="1" dirty="0"/>
                         <a:t>Low </a:t>
                       </a:r>
                     </a:p>
@@ -33747,7 +34045,7 @@
                     <a:lstStyle/>
                     <a:p>
                       <a:r>
-                        <a:rPr lang="en-US" dirty="0"/>
+                        <a:rPr lang="en-US" b="1" dirty="0"/>
                         <a:t>High </a:t>
                       </a:r>
                     </a:p>
@@ -33760,7 +34058,7 @@
                     <a:lstStyle/>
                     <a:p>
                       <a:r>
-                        <a:rPr lang="en-US" dirty="0"/>
+                        <a:rPr lang="en-US" b="1" dirty="0"/>
                         <a:t>Crybaby, telemarketer</a:t>
                       </a:r>
                     </a:p>
@@ -33914,7 +34212,7 @@
           <a:p>
             <a:fld id="{48F63A3B-78C7-47BE-AE5E-E10140E04643}" type="slidenum">
               <a:rPr lang="en-US" smtClean="0"/>
-              <a:t>15</a:t>
+              <a:t>17</a:t>
             </a:fld>
             <a:endParaRPr lang="en-US" dirty="0"/>
           </a:p>
@@ -33933,7 +34231,7 @@
 </p:sld>
 </file>
 
-<file path=ppt/slides/slide16.xml><?xml version="1.0" encoding="utf-8"?>
+<file path=ppt/slides/slide18.xml><?xml version="1.0" encoding="utf-8"?>
 <p:sld xmlns:a="http://schemas.openxmlformats.org/drawingml/2006/main" xmlns:r="http://schemas.openxmlformats.org/officeDocument/2006/relationships" xmlns:p="http://schemas.openxmlformats.org/presentationml/2006/main">
   <p:cSld>
     <p:spTree>
@@ -33994,7 +34292,7 @@
             <p:ph sz="half" idx="1"/>
             <p:extLst>
               <p:ext uri="{D42A27DB-BD31-4B8C-83A1-F6EECF244321}">
-                <p14:modId xmlns:p14="http://schemas.microsoft.com/office/powerpoint/2010/main" val="3679670991"/>
+                <p14:modId xmlns:p14="http://schemas.microsoft.com/office/powerpoint/2010/main" val="2082498403"/>
               </p:ext>
             </p:extLst>
           </p:nvPr>
@@ -34646,7 +34944,7 @@
                         <a:defRPr/>
                       </a:pPr>
                       <a:r>
-                        <a:rPr kumimoji="0" lang="en-US" sz="1800" b="0" i="0" u="none" strike="noStrike" kern="1200" cap="none" spc="0" normalizeH="0" baseline="0" noProof="0" dirty="0">
+                        <a:rPr kumimoji="0" lang="en-US" sz="1800" b="1" i="0" u="none" strike="noStrike" kern="1200" cap="none" spc="0" normalizeH="0" baseline="0" noProof="0" dirty="0">
                           <a:ln>
                             <a:noFill/>
                           </a:ln>
@@ -34672,7 +34970,7 @@
                     <a:lstStyle/>
                     <a:p>
                       <a:r>
-                        <a:rPr lang="en-US" dirty="0"/>
+                        <a:rPr lang="en-US" b="1" dirty="0"/>
                         <a:t>Low</a:t>
                       </a:r>
                     </a:p>
@@ -34685,7 +34983,7 @@
                     <a:lstStyle/>
                     <a:p>
                       <a:r>
-                        <a:rPr lang="en-US" dirty="0"/>
+                        <a:rPr lang="en-US" b="1" dirty="0"/>
                         <a:t>Low</a:t>
                       </a:r>
                     </a:p>
@@ -34698,13 +34996,13 @@
                     <a:lstStyle/>
                     <a:p>
                       <a:r>
-                        <a:rPr lang="en-US" dirty="0"/>
+                        <a:rPr lang="en-US" b="1" dirty="0"/>
                         <a:t>Do nothing,</a:t>
                       </a:r>
                     </a:p>
                     <a:p>
                       <a:r>
-                        <a:rPr lang="en-US" dirty="0"/>
+                        <a:rPr lang="en-US" b="1" dirty="0"/>
                         <a:t>deadbeat</a:t>
                       </a:r>
                     </a:p>
@@ -34772,7 +35070,7 @@
           <a:p>
             <a:fld id="{48F63A3B-78C7-47BE-AE5E-E10140E04643}" type="slidenum">
               <a:rPr lang="en-US" smtClean="0"/>
-              <a:t>16</a:t>
+              <a:t>18</a:t>
             </a:fld>
             <a:endParaRPr lang="en-US" dirty="0"/>
           </a:p>
@@ -34791,7 +35089,7 @@
 </p:sld>
 </file>
 
-<file path=ppt/slides/slide17.xml><?xml version="1.0" encoding="utf-8"?>
+<file path=ppt/slides/slide19.xml><?xml version="1.0" encoding="utf-8"?>
 <p:sld xmlns:a="http://schemas.openxmlformats.org/drawingml/2006/main" xmlns:r="http://schemas.openxmlformats.org/officeDocument/2006/relationships" xmlns:p="http://schemas.openxmlformats.org/presentationml/2006/main">
   <p:cSld>
     <p:spTree>
@@ -34921,7 +35219,7 @@
           <a:p>
             <a:fld id="{48F63A3B-78C7-47BE-AE5E-E10140E04643}" type="slidenum">
               <a:rPr lang="en-US" smtClean="0"/>
-              <a:t>17</a:t>
+              <a:t>19</a:t>
             </a:fld>
             <a:endParaRPr lang="en-US" dirty="0"/>
           </a:p>
@@ -34931,248 +35229,6 @@
     <p:extLst>
       <p:ext uri="{BB962C8B-B14F-4D97-AF65-F5344CB8AC3E}">
         <p14:creationId xmlns:p14="http://schemas.microsoft.com/office/powerpoint/2010/main" val="1066550180"/>
-      </p:ext>
-    </p:extLst>
-  </p:cSld>
-  <p:clrMapOvr>
-    <a:masterClrMapping/>
-  </p:clrMapOvr>
-</p:sld>
-</file>
-
-<file path=ppt/slides/slide18.xml><?xml version="1.0" encoding="utf-8"?>
-<p:sld xmlns:a="http://schemas.openxmlformats.org/drawingml/2006/main" xmlns:r="http://schemas.openxmlformats.org/officeDocument/2006/relationships" xmlns:p="http://schemas.openxmlformats.org/presentationml/2006/main">
-  <p:cSld>
-    <p:spTree>
-      <p:nvGrpSpPr>
-        <p:cNvPr id="1" name=""/>
-        <p:cNvGrpSpPr/>
-        <p:nvPr/>
-      </p:nvGrpSpPr>
-      <p:grpSpPr>
-        <a:xfrm>
-          <a:off x="0" y="0"/>
-          <a:ext cx="0" cy="0"/>
-          <a:chOff x="0" y="0"/>
-          <a:chExt cx="0" cy="0"/>
-        </a:xfrm>
-      </p:grpSpPr>
-      <p:sp>
-        <p:nvSpPr>
-          <p:cNvPr id="6" name="Title 5">
-            <a:extLst>
-              <a:ext uri="{FF2B5EF4-FFF2-40B4-BE49-F238E27FC236}">
-                <a16:creationId xmlns:a16="http://schemas.microsoft.com/office/drawing/2014/main" id="{FA913E92-FAF4-FF82-E958-0F057D7C7E91}"/>
-              </a:ext>
-            </a:extLst>
-          </p:cNvPr>
-          <p:cNvSpPr>
-            <a:spLocks noGrp="1"/>
-          </p:cNvSpPr>
-          <p:nvPr>
-            <p:ph type="title"/>
-          </p:nvPr>
-        </p:nvSpPr>
-        <p:spPr/>
-        <p:txBody>
-          <a:bodyPr/>
-          <a:lstStyle/>
-          <a:p>
-            <a:r>
-              <a:rPr lang="en-US" dirty="0"/>
-              <a:t>Interact</a:t>
-            </a:r>
-          </a:p>
-        </p:txBody>
-      </p:sp>
-      <p:sp>
-        <p:nvSpPr>
-          <p:cNvPr id="7" name="Text Placeholder 6">
-            <a:extLst>
-              <a:ext uri="{FF2B5EF4-FFF2-40B4-BE49-F238E27FC236}">
-                <a16:creationId xmlns:a16="http://schemas.microsoft.com/office/drawing/2014/main" id="{F966DD80-50B4-D911-123C-DD3B20041E89}"/>
-              </a:ext>
-            </a:extLst>
-          </p:cNvPr>
-          <p:cNvSpPr>
-            <a:spLocks noGrp="1"/>
-          </p:cNvSpPr>
-          <p:nvPr>
-            <p:ph type="body" idx="1"/>
-          </p:nvPr>
-        </p:nvSpPr>
-        <p:spPr/>
-        <p:txBody>
-          <a:bodyPr/>
-          <a:lstStyle/>
-          <a:p>
-            <a:endParaRPr lang="en-US" dirty="0"/>
-          </a:p>
-        </p:txBody>
-      </p:sp>
-      <p:sp>
-        <p:nvSpPr>
-          <p:cNvPr id="4" name="Footer Placeholder 3">
-            <a:extLst>
-              <a:ext uri="{FF2B5EF4-FFF2-40B4-BE49-F238E27FC236}">
-                <a16:creationId xmlns:a16="http://schemas.microsoft.com/office/drawing/2014/main" id="{8872D58F-5380-CAA4-5CF5-44567CDFBD38}"/>
-              </a:ext>
-            </a:extLst>
-          </p:cNvPr>
-          <p:cNvSpPr>
-            <a:spLocks noGrp="1"/>
-          </p:cNvSpPr>
-          <p:nvPr>
-            <p:ph type="ftr" sz="quarter" idx="4294967295"/>
-          </p:nvPr>
-        </p:nvSpPr>
-        <p:spPr>
-          <a:xfrm>
-            <a:off x="0" y="457200"/>
-            <a:ext cx="3200400" cy="274638"/>
-          </a:xfrm>
-        </p:spPr>
-        <p:txBody>
-          <a:bodyPr/>
-          <a:lstStyle/>
-          <a:p>
-            <a:r>
-              <a:rPr lang="en-US" dirty="0"/>
-              <a:t>Affect Control Theory: Sentiments</a:t>
-            </a:r>
-          </a:p>
-        </p:txBody>
-      </p:sp>
-      <p:sp>
-        <p:nvSpPr>
-          <p:cNvPr id="5" name="Slide Number Placeholder 4">
-            <a:extLst>
-              <a:ext uri="{FF2B5EF4-FFF2-40B4-BE49-F238E27FC236}">
-                <a16:creationId xmlns:a16="http://schemas.microsoft.com/office/drawing/2014/main" id="{4FBA2C81-1C35-F6E1-1468-0E5512EF799B}"/>
-              </a:ext>
-            </a:extLst>
-          </p:cNvPr>
-          <p:cNvSpPr>
-            <a:spLocks noGrp="1"/>
-          </p:cNvSpPr>
-          <p:nvPr>
-            <p:ph type="sldNum" sz="quarter" idx="4294967295"/>
-          </p:nvPr>
-        </p:nvSpPr>
-        <p:spPr>
-          <a:xfrm>
-            <a:off x="11204575" y="457200"/>
-            <a:ext cx="987425" cy="274638"/>
-          </a:xfrm>
-        </p:spPr>
-        <p:txBody>
-          <a:bodyPr/>
-          <a:lstStyle/>
-          <a:p>
-            <a:fld id="{48F63A3B-78C7-47BE-AE5E-E10140E04643}" type="slidenum">
-              <a:rPr lang="en-US" smtClean="0"/>
-              <a:t>18</a:t>
-            </a:fld>
-            <a:endParaRPr lang="en-US" dirty="0"/>
-          </a:p>
-        </p:txBody>
-      </p:sp>
-    </p:spTree>
-    <p:extLst>
-      <p:ext uri="{BB962C8B-B14F-4D97-AF65-F5344CB8AC3E}">
-        <p14:creationId xmlns:p14="http://schemas.microsoft.com/office/powerpoint/2010/main" val="782978090"/>
-      </p:ext>
-    </p:extLst>
-  </p:cSld>
-  <p:clrMapOvr>
-    <a:masterClrMapping/>
-  </p:clrMapOvr>
-</p:sld>
-</file>
-
-<file path=ppt/slides/slide19.xml><?xml version="1.0" encoding="utf-8"?>
-<p:sld xmlns:a="http://schemas.openxmlformats.org/drawingml/2006/main" xmlns:r="http://schemas.openxmlformats.org/officeDocument/2006/relationships" xmlns:p="http://schemas.openxmlformats.org/presentationml/2006/main">
-  <p:cSld>
-    <p:spTree>
-      <p:nvGrpSpPr>
-        <p:cNvPr id="1" name=""/>
-        <p:cNvGrpSpPr/>
-        <p:nvPr/>
-      </p:nvGrpSpPr>
-      <p:grpSpPr>
-        <a:xfrm>
-          <a:off x="0" y="0"/>
-          <a:ext cx="0" cy="0"/>
-          <a:chOff x="0" y="0"/>
-          <a:chExt cx="0" cy="0"/>
-        </a:xfrm>
-      </p:grpSpPr>
-      <p:sp>
-        <p:nvSpPr>
-          <p:cNvPr id="4" name="Title 3">
-            <a:extLst>
-              <a:ext uri="{FF2B5EF4-FFF2-40B4-BE49-F238E27FC236}">
-                <a16:creationId xmlns:a16="http://schemas.microsoft.com/office/drawing/2014/main" id="{BC76E060-AA35-54C7-E884-546FF66B67E6}"/>
-              </a:ext>
-            </a:extLst>
-          </p:cNvPr>
-          <p:cNvSpPr>
-            <a:spLocks noGrp="1"/>
-          </p:cNvSpPr>
-          <p:nvPr>
-            <p:ph type="title"/>
-          </p:nvPr>
-        </p:nvSpPr>
-        <p:spPr/>
-        <p:txBody>
-          <a:bodyPr/>
-          <a:lstStyle/>
-          <a:p>
-            <a:r>
-              <a:rPr lang="en-US" dirty="0"/>
-              <a:t>Download it:</a:t>
-            </a:r>
-          </a:p>
-        </p:txBody>
-      </p:sp>
-      <p:sp>
-        <p:nvSpPr>
-          <p:cNvPr id="5" name="Content Placeholder 4">
-            <a:extLst>
-              <a:ext uri="{FF2B5EF4-FFF2-40B4-BE49-F238E27FC236}">
-                <a16:creationId xmlns:a16="http://schemas.microsoft.com/office/drawing/2014/main" id="{F2ED3457-B11A-CC00-5729-B859C9FB02E7}"/>
-              </a:ext>
-            </a:extLst>
-          </p:cNvPr>
-          <p:cNvSpPr>
-            <a:spLocks noGrp="1"/>
-          </p:cNvSpPr>
-          <p:nvPr>
-            <p:ph idx="1"/>
-          </p:nvPr>
-        </p:nvSpPr>
-        <p:spPr/>
-        <p:txBody>
-          <a:bodyPr/>
-          <a:lstStyle/>
-          <a:p>
-            <a:r>
-              <a:rPr lang="en-US" dirty="0">
-                <a:hlinkClick r:id="rId2"/>
-              </a:rPr>
-              <a:t>https://kb-research.ca/interact/</a:t>
-            </a:r>
-            <a:endParaRPr lang="en-US" dirty="0"/>
-          </a:p>
-          <a:p>
-            <a:endParaRPr lang="en-US" dirty="0"/>
-          </a:p>
-        </p:txBody>
-      </p:sp>
-    </p:spTree>
-    <p:extLst>
-      <p:ext uri="{BB962C8B-B14F-4D97-AF65-F5344CB8AC3E}">
-        <p14:creationId xmlns:p14="http://schemas.microsoft.com/office/powerpoint/2010/main" val="1740933476"/>
       </p:ext>
     </p:extLst>
   </p:cSld>
@@ -35290,6 +35346,135 @@
           </a:p>
         </p:txBody>
       </p:sp>
+      <p:sp>
+        <p:nvSpPr>
+          <p:cNvPr id="4" name="Footer Placeholder 1">
+            <a:extLst>
+              <a:ext uri="{FF2B5EF4-FFF2-40B4-BE49-F238E27FC236}">
+                <a16:creationId xmlns:a16="http://schemas.microsoft.com/office/drawing/2014/main" id="{DFF614EA-D83E-0821-793A-25D56B29DD6C}"/>
+              </a:ext>
+            </a:extLst>
+          </p:cNvPr>
+          <p:cNvSpPr txBox="1">
+            <a:spLocks/>
+          </p:cNvSpPr>
+          <p:nvPr/>
+        </p:nvSpPr>
+        <p:spPr>
+          <a:xfrm>
+            <a:off x="128588" y="228600"/>
+            <a:ext cx="3200400" cy="274638"/>
+          </a:xfrm>
+          <a:prstGeom prst="rect">
+            <a:avLst/>
+          </a:prstGeom>
+        </p:spPr>
+        <p:txBody>
+          <a:bodyPr vert="horz" lIns="91440" tIns="45720" rIns="91440" bIns="45720" rtlCol="0" anchor="ctr"/>
+          <a:lstStyle>
+            <a:defPPr>
+              <a:defRPr lang="en-US"/>
+            </a:defPPr>
+            <a:lvl1pPr marL="0" algn="l" defTabSz="457200" rtl="0" eaLnBrk="1" latinLnBrk="0" hangingPunct="1">
+              <a:defRPr sz="1200" kern="1200">
+                <a:solidFill>
+                  <a:schemeClr val="accent6"/>
+                </a:solidFill>
+                <a:latin typeface="Arial" panose="020B0604020202020204" pitchFamily="34" charset="0"/>
+                <a:ea typeface="+mn-ea"/>
+                <a:cs typeface="Arial" panose="020B0604020202020204" pitchFamily="34" charset="0"/>
+              </a:defRPr>
+            </a:lvl1pPr>
+            <a:lvl2pPr marL="457200" algn="l" defTabSz="457200" rtl="0" eaLnBrk="1" latinLnBrk="0" hangingPunct="1">
+              <a:defRPr sz="1800" kern="1200">
+                <a:solidFill>
+                  <a:schemeClr val="tx1"/>
+                </a:solidFill>
+                <a:latin typeface="+mn-lt"/>
+                <a:ea typeface="+mn-ea"/>
+                <a:cs typeface="+mn-cs"/>
+              </a:defRPr>
+            </a:lvl2pPr>
+            <a:lvl3pPr marL="914400" algn="l" defTabSz="457200" rtl="0" eaLnBrk="1" latinLnBrk="0" hangingPunct="1">
+              <a:defRPr sz="1800" kern="1200">
+                <a:solidFill>
+                  <a:schemeClr val="tx1"/>
+                </a:solidFill>
+                <a:latin typeface="+mn-lt"/>
+                <a:ea typeface="+mn-ea"/>
+                <a:cs typeface="+mn-cs"/>
+              </a:defRPr>
+            </a:lvl3pPr>
+            <a:lvl4pPr marL="1371600" algn="l" defTabSz="457200" rtl="0" eaLnBrk="1" latinLnBrk="0" hangingPunct="1">
+              <a:defRPr sz="1800" kern="1200">
+                <a:solidFill>
+                  <a:schemeClr val="tx1"/>
+                </a:solidFill>
+                <a:latin typeface="+mn-lt"/>
+                <a:ea typeface="+mn-ea"/>
+                <a:cs typeface="+mn-cs"/>
+              </a:defRPr>
+            </a:lvl4pPr>
+            <a:lvl5pPr marL="1828800" algn="l" defTabSz="457200" rtl="0" eaLnBrk="1" latinLnBrk="0" hangingPunct="1">
+              <a:defRPr sz="1800" kern="1200">
+                <a:solidFill>
+                  <a:schemeClr val="tx1"/>
+                </a:solidFill>
+                <a:latin typeface="+mn-lt"/>
+                <a:ea typeface="+mn-ea"/>
+                <a:cs typeface="+mn-cs"/>
+              </a:defRPr>
+            </a:lvl5pPr>
+            <a:lvl6pPr marL="2286000" algn="l" defTabSz="457200" rtl="0" eaLnBrk="1" latinLnBrk="0" hangingPunct="1">
+              <a:defRPr sz="1800" kern="1200">
+                <a:solidFill>
+                  <a:schemeClr val="tx1"/>
+                </a:solidFill>
+                <a:latin typeface="+mn-lt"/>
+                <a:ea typeface="+mn-ea"/>
+                <a:cs typeface="+mn-cs"/>
+              </a:defRPr>
+            </a:lvl6pPr>
+            <a:lvl7pPr marL="2743200" algn="l" defTabSz="457200" rtl="0" eaLnBrk="1" latinLnBrk="0" hangingPunct="1">
+              <a:defRPr sz="1800" kern="1200">
+                <a:solidFill>
+                  <a:schemeClr val="tx1"/>
+                </a:solidFill>
+                <a:latin typeface="+mn-lt"/>
+                <a:ea typeface="+mn-ea"/>
+                <a:cs typeface="+mn-cs"/>
+              </a:defRPr>
+            </a:lvl7pPr>
+            <a:lvl8pPr marL="3200400" algn="l" defTabSz="457200" rtl="0" eaLnBrk="1" latinLnBrk="0" hangingPunct="1">
+              <a:defRPr sz="1800" kern="1200">
+                <a:solidFill>
+                  <a:schemeClr val="tx1"/>
+                </a:solidFill>
+                <a:latin typeface="+mn-lt"/>
+                <a:ea typeface="+mn-ea"/>
+                <a:cs typeface="+mn-cs"/>
+              </a:defRPr>
+            </a:lvl8pPr>
+            <a:lvl9pPr marL="3657600" algn="l" defTabSz="457200" rtl="0" eaLnBrk="1" latinLnBrk="0" hangingPunct="1">
+              <a:defRPr sz="1800" kern="1200">
+                <a:solidFill>
+                  <a:schemeClr val="tx1"/>
+                </a:solidFill>
+                <a:latin typeface="+mn-lt"/>
+                <a:ea typeface="+mn-ea"/>
+                <a:cs typeface="+mn-cs"/>
+              </a:defRPr>
+            </a:lvl9pPr>
+          </a:lstStyle>
+          <a:p>
+            <a:r>
+              <a:rPr lang="en-US"/>
+              <a:t>Affect Control Theory: Sentiments</a:t>
+            </a:r>
+            <a:endParaRPr lang="en-US" dirty="0"/>
+          </a:p>
+        </p:txBody>
+      </p:sp>
     </p:spTree>
     <p:extLst>
       <p:ext uri="{BB962C8B-B14F-4D97-AF65-F5344CB8AC3E}">
@@ -35304,6 +35489,248 @@
 </file>
 
 <file path=ppt/slides/slide20.xml><?xml version="1.0" encoding="utf-8"?>
+<p:sld xmlns:a="http://schemas.openxmlformats.org/drawingml/2006/main" xmlns:r="http://schemas.openxmlformats.org/officeDocument/2006/relationships" xmlns:p="http://schemas.openxmlformats.org/presentationml/2006/main">
+  <p:cSld>
+    <p:spTree>
+      <p:nvGrpSpPr>
+        <p:cNvPr id="1" name=""/>
+        <p:cNvGrpSpPr/>
+        <p:nvPr/>
+      </p:nvGrpSpPr>
+      <p:grpSpPr>
+        <a:xfrm>
+          <a:off x="0" y="0"/>
+          <a:ext cx="0" cy="0"/>
+          <a:chOff x="0" y="0"/>
+          <a:chExt cx="0" cy="0"/>
+        </a:xfrm>
+      </p:grpSpPr>
+      <p:sp>
+        <p:nvSpPr>
+          <p:cNvPr id="6" name="Title 5">
+            <a:extLst>
+              <a:ext uri="{FF2B5EF4-FFF2-40B4-BE49-F238E27FC236}">
+                <a16:creationId xmlns:a16="http://schemas.microsoft.com/office/drawing/2014/main" id="{FA913E92-FAF4-FF82-E958-0F057D7C7E91}"/>
+              </a:ext>
+            </a:extLst>
+          </p:cNvPr>
+          <p:cNvSpPr>
+            <a:spLocks noGrp="1"/>
+          </p:cNvSpPr>
+          <p:nvPr>
+            <p:ph type="title"/>
+          </p:nvPr>
+        </p:nvSpPr>
+        <p:spPr/>
+        <p:txBody>
+          <a:bodyPr/>
+          <a:lstStyle/>
+          <a:p>
+            <a:r>
+              <a:rPr lang="en-US" dirty="0"/>
+              <a:t>Interact</a:t>
+            </a:r>
+          </a:p>
+        </p:txBody>
+      </p:sp>
+      <p:sp>
+        <p:nvSpPr>
+          <p:cNvPr id="7" name="Text Placeholder 6">
+            <a:extLst>
+              <a:ext uri="{FF2B5EF4-FFF2-40B4-BE49-F238E27FC236}">
+                <a16:creationId xmlns:a16="http://schemas.microsoft.com/office/drawing/2014/main" id="{F966DD80-50B4-D911-123C-DD3B20041E89}"/>
+              </a:ext>
+            </a:extLst>
+          </p:cNvPr>
+          <p:cNvSpPr>
+            <a:spLocks noGrp="1"/>
+          </p:cNvSpPr>
+          <p:nvPr>
+            <p:ph type="body" idx="1"/>
+          </p:nvPr>
+        </p:nvSpPr>
+        <p:spPr/>
+        <p:txBody>
+          <a:bodyPr/>
+          <a:lstStyle/>
+          <a:p>
+            <a:endParaRPr lang="en-US" dirty="0"/>
+          </a:p>
+        </p:txBody>
+      </p:sp>
+      <p:sp>
+        <p:nvSpPr>
+          <p:cNvPr id="4" name="Footer Placeholder 3">
+            <a:extLst>
+              <a:ext uri="{FF2B5EF4-FFF2-40B4-BE49-F238E27FC236}">
+                <a16:creationId xmlns:a16="http://schemas.microsoft.com/office/drawing/2014/main" id="{8872D58F-5380-CAA4-5CF5-44567CDFBD38}"/>
+              </a:ext>
+            </a:extLst>
+          </p:cNvPr>
+          <p:cNvSpPr>
+            <a:spLocks noGrp="1"/>
+          </p:cNvSpPr>
+          <p:nvPr>
+            <p:ph type="ftr" sz="quarter" idx="4294967295"/>
+          </p:nvPr>
+        </p:nvSpPr>
+        <p:spPr>
+          <a:xfrm>
+            <a:off x="0" y="457200"/>
+            <a:ext cx="3200400" cy="274638"/>
+          </a:xfrm>
+        </p:spPr>
+        <p:txBody>
+          <a:bodyPr/>
+          <a:lstStyle/>
+          <a:p>
+            <a:r>
+              <a:rPr lang="en-US" dirty="0"/>
+              <a:t>Affect Control Theory: Sentiments</a:t>
+            </a:r>
+          </a:p>
+        </p:txBody>
+      </p:sp>
+      <p:sp>
+        <p:nvSpPr>
+          <p:cNvPr id="5" name="Slide Number Placeholder 4">
+            <a:extLst>
+              <a:ext uri="{FF2B5EF4-FFF2-40B4-BE49-F238E27FC236}">
+                <a16:creationId xmlns:a16="http://schemas.microsoft.com/office/drawing/2014/main" id="{4FBA2C81-1C35-F6E1-1468-0E5512EF799B}"/>
+              </a:ext>
+            </a:extLst>
+          </p:cNvPr>
+          <p:cNvSpPr>
+            <a:spLocks noGrp="1"/>
+          </p:cNvSpPr>
+          <p:nvPr>
+            <p:ph type="sldNum" sz="quarter" idx="4294967295"/>
+          </p:nvPr>
+        </p:nvSpPr>
+        <p:spPr>
+          <a:xfrm>
+            <a:off x="11204575" y="457200"/>
+            <a:ext cx="987425" cy="274638"/>
+          </a:xfrm>
+        </p:spPr>
+        <p:txBody>
+          <a:bodyPr/>
+          <a:lstStyle/>
+          <a:p>
+            <a:fld id="{48F63A3B-78C7-47BE-AE5E-E10140E04643}" type="slidenum">
+              <a:rPr lang="en-US" smtClean="0"/>
+              <a:t>20</a:t>
+            </a:fld>
+            <a:endParaRPr lang="en-US" dirty="0"/>
+          </a:p>
+        </p:txBody>
+      </p:sp>
+    </p:spTree>
+    <p:extLst>
+      <p:ext uri="{BB962C8B-B14F-4D97-AF65-F5344CB8AC3E}">
+        <p14:creationId xmlns:p14="http://schemas.microsoft.com/office/powerpoint/2010/main" val="782978090"/>
+      </p:ext>
+    </p:extLst>
+  </p:cSld>
+  <p:clrMapOvr>
+    <a:masterClrMapping/>
+  </p:clrMapOvr>
+</p:sld>
+</file>
+
+<file path=ppt/slides/slide21.xml><?xml version="1.0" encoding="utf-8"?>
+<p:sld xmlns:a="http://schemas.openxmlformats.org/drawingml/2006/main" xmlns:r="http://schemas.openxmlformats.org/officeDocument/2006/relationships" xmlns:p="http://schemas.openxmlformats.org/presentationml/2006/main">
+  <p:cSld>
+    <p:spTree>
+      <p:nvGrpSpPr>
+        <p:cNvPr id="1" name=""/>
+        <p:cNvGrpSpPr/>
+        <p:nvPr/>
+      </p:nvGrpSpPr>
+      <p:grpSpPr>
+        <a:xfrm>
+          <a:off x="0" y="0"/>
+          <a:ext cx="0" cy="0"/>
+          <a:chOff x="0" y="0"/>
+          <a:chExt cx="0" cy="0"/>
+        </a:xfrm>
+      </p:grpSpPr>
+      <p:sp>
+        <p:nvSpPr>
+          <p:cNvPr id="4" name="Title 3">
+            <a:extLst>
+              <a:ext uri="{FF2B5EF4-FFF2-40B4-BE49-F238E27FC236}">
+                <a16:creationId xmlns:a16="http://schemas.microsoft.com/office/drawing/2014/main" id="{BC76E060-AA35-54C7-E884-546FF66B67E6}"/>
+              </a:ext>
+            </a:extLst>
+          </p:cNvPr>
+          <p:cNvSpPr>
+            <a:spLocks noGrp="1"/>
+          </p:cNvSpPr>
+          <p:nvPr>
+            <p:ph type="title"/>
+          </p:nvPr>
+        </p:nvSpPr>
+        <p:spPr/>
+        <p:txBody>
+          <a:bodyPr/>
+          <a:lstStyle/>
+          <a:p>
+            <a:r>
+              <a:rPr lang="en-US" dirty="0"/>
+              <a:t>Download it:</a:t>
+            </a:r>
+          </a:p>
+        </p:txBody>
+      </p:sp>
+      <p:sp>
+        <p:nvSpPr>
+          <p:cNvPr id="5" name="Content Placeholder 4">
+            <a:extLst>
+              <a:ext uri="{FF2B5EF4-FFF2-40B4-BE49-F238E27FC236}">
+                <a16:creationId xmlns:a16="http://schemas.microsoft.com/office/drawing/2014/main" id="{F2ED3457-B11A-CC00-5729-B859C9FB02E7}"/>
+              </a:ext>
+            </a:extLst>
+          </p:cNvPr>
+          <p:cNvSpPr>
+            <a:spLocks noGrp="1"/>
+          </p:cNvSpPr>
+          <p:nvPr>
+            <p:ph idx="1"/>
+          </p:nvPr>
+        </p:nvSpPr>
+        <p:spPr/>
+        <p:txBody>
+          <a:bodyPr/>
+          <a:lstStyle/>
+          <a:p>
+            <a:r>
+              <a:rPr lang="en-US" dirty="0">
+                <a:hlinkClick r:id="rId2"/>
+              </a:rPr>
+              <a:t>https://kb-research.ca/interact/</a:t>
+            </a:r>
+            <a:endParaRPr lang="en-US" dirty="0"/>
+          </a:p>
+          <a:p>
+            <a:endParaRPr lang="en-US" dirty="0"/>
+          </a:p>
+        </p:txBody>
+      </p:sp>
+    </p:spTree>
+    <p:extLst>
+      <p:ext uri="{BB962C8B-B14F-4D97-AF65-F5344CB8AC3E}">
+        <p14:creationId xmlns:p14="http://schemas.microsoft.com/office/powerpoint/2010/main" val="1740933476"/>
+      </p:ext>
+    </p:extLst>
+  </p:cSld>
+  <p:clrMapOvr>
+    <a:masterClrMapping/>
+  </p:clrMapOvr>
+</p:sld>
+</file>
+
+<file path=ppt/slides/slide22.xml><?xml version="1.0" encoding="utf-8"?>
 <p:sld xmlns:a="http://schemas.openxmlformats.org/drawingml/2006/main" xmlns:r="http://schemas.openxmlformats.org/officeDocument/2006/relationships" xmlns:p="http://schemas.openxmlformats.org/presentationml/2006/main">
   <p:cSld>
     <p:spTree>
@@ -35465,7 +35892,7 @@
                   <a:spcPts val="600"/>
                 </a:spcAft>
               </a:pPr>
-              <a:t>20</a:t>
+              <a:t>22</a:t>
             </a:fld>
             <a:endParaRPr lang="en-US"/>
           </a:p>
@@ -35484,7 +35911,7 @@
 </p:sld>
 </file>
 
-<file path=ppt/slides/slide21.xml><?xml version="1.0" encoding="utf-8"?>
+<file path=ppt/slides/slide23.xml><?xml version="1.0" encoding="utf-8"?>
 <p:sld xmlns:a="http://schemas.openxmlformats.org/drawingml/2006/main" xmlns:r="http://schemas.openxmlformats.org/officeDocument/2006/relationships" xmlns:p="http://schemas.openxmlformats.org/presentationml/2006/main">
   <p:cSld>
     <p:spTree>
@@ -35650,7 +36077,7 @@
           <a:p>
             <a:fld id="{48F63A3B-78C7-47BE-AE5E-E10140E04643}" type="slidenum">
               <a:rPr lang="en-US" smtClean="0"/>
-              <a:t>21</a:t>
+              <a:t>23</a:t>
             </a:fld>
             <a:endParaRPr lang="en-US" dirty="0"/>
           </a:p>
@@ -35669,7 +36096,7 @@
 </p:sld>
 </file>
 
-<file path=ppt/slides/slide22.xml><?xml version="1.0" encoding="utf-8"?>
+<file path=ppt/slides/slide24.xml><?xml version="1.0" encoding="utf-8"?>
 <p:sld xmlns:a="http://schemas.openxmlformats.org/drawingml/2006/main" xmlns:r="http://schemas.openxmlformats.org/officeDocument/2006/relationships" xmlns:p="http://schemas.openxmlformats.org/presentationml/2006/main">
   <p:cSld>
     <p:spTree>
@@ -35794,7 +36221,7 @@
           <a:p>
             <a:fld id="{48F63A3B-78C7-47BE-AE5E-E10140E04643}" type="slidenum">
               <a:rPr lang="en-US" smtClean="0"/>
-              <a:t>22</a:t>
+              <a:t>24</a:t>
             </a:fld>
             <a:endParaRPr lang="en-US" dirty="0"/>
           </a:p>
@@ -35813,7 +36240,7 @@
 </p:sld>
 </file>
 
-<file path=ppt/slides/slide23.xml><?xml version="1.0" encoding="utf-8"?>
+<file path=ppt/slides/slide25.xml><?xml version="1.0" encoding="utf-8"?>
 <p:sld xmlns:a="http://schemas.openxmlformats.org/drawingml/2006/main" xmlns:r="http://schemas.openxmlformats.org/officeDocument/2006/relationships" xmlns:p="http://schemas.openxmlformats.org/presentationml/2006/main">
   <p:cSld>
     <p:spTree>
@@ -35938,7 +36365,7 @@
           <a:p>
             <a:fld id="{48F63A3B-78C7-47BE-AE5E-E10140E04643}" type="slidenum">
               <a:rPr lang="en-US" smtClean="0"/>
-              <a:t>23</a:t>
+              <a:t>25</a:t>
             </a:fld>
             <a:endParaRPr lang="en-US" dirty="0"/>
           </a:p>
@@ -36012,7 +36439,7 @@
 </p:sld>
 </file>
 
-<file path=ppt/slides/slide24.xml><?xml version="1.0" encoding="utf-8"?>
+<file path=ppt/slides/slide26.xml><?xml version="1.0" encoding="utf-8"?>
 <p:sld xmlns:a="http://schemas.openxmlformats.org/drawingml/2006/main" xmlns:r="http://schemas.openxmlformats.org/officeDocument/2006/relationships" xmlns:p="http://schemas.openxmlformats.org/presentationml/2006/main">
   <p:cSld>
     <p:spTree>
@@ -36137,7 +36564,7 @@
           <a:p>
             <a:fld id="{48F63A3B-78C7-47BE-AE5E-E10140E04643}" type="slidenum">
               <a:rPr lang="en-US" smtClean="0"/>
-              <a:t>24</a:t>
+              <a:t>26</a:t>
             </a:fld>
             <a:endParaRPr lang="en-US" dirty="0"/>
           </a:p>
@@ -36195,7 +36622,7 @@
 </p:sld>
 </file>
 
-<file path=ppt/slides/slide25.xml><?xml version="1.0" encoding="utf-8"?>
+<file path=ppt/slides/slide27.xml><?xml version="1.0" encoding="utf-8"?>
 <p:sld xmlns:a="http://schemas.openxmlformats.org/drawingml/2006/main" xmlns:r="http://schemas.openxmlformats.org/officeDocument/2006/relationships" xmlns:p="http://schemas.openxmlformats.org/presentationml/2006/main">
   <p:cSld>
     <p:spTree>
@@ -36325,7 +36752,7 @@
           <a:p>
             <a:fld id="{48F63A3B-78C7-47BE-AE5E-E10140E04643}" type="slidenum">
               <a:rPr lang="en-US" smtClean="0"/>
-              <a:t>25</a:t>
+              <a:t>27</a:t>
             </a:fld>
             <a:endParaRPr lang="en-US" dirty="0"/>
           </a:p>
@@ -36344,7 +36771,7 @@
 </p:sld>
 </file>
 
-<file path=ppt/slides/slide26.xml><?xml version="1.0" encoding="utf-8"?>
+<file path=ppt/slides/slide28.xml><?xml version="1.0" encoding="utf-8"?>
 <p:sld xmlns:a="http://schemas.openxmlformats.org/drawingml/2006/main" xmlns:r="http://schemas.openxmlformats.org/officeDocument/2006/relationships" xmlns:p="http://schemas.openxmlformats.org/presentationml/2006/main">
   <p:cSld>
     <p:spTree>
@@ -36469,7 +36896,7 @@
           <a:p>
             <a:fld id="{48F63A3B-78C7-47BE-AE5E-E10140E04643}" type="slidenum">
               <a:rPr lang="en-US" smtClean="0"/>
-              <a:t>26</a:t>
+              <a:t>28</a:t>
             </a:fld>
             <a:endParaRPr lang="en-US" dirty="0"/>
           </a:p>
@@ -36610,7 +37037,7 @@
 </p:sld>
 </file>
 
-<file path=ppt/slides/slide27.xml><?xml version="1.0" encoding="utf-8"?>
+<file path=ppt/slides/slide29.xml><?xml version="1.0" encoding="utf-8"?>
 <p:sld xmlns:a="http://schemas.openxmlformats.org/drawingml/2006/main" xmlns:r="http://schemas.openxmlformats.org/officeDocument/2006/relationships" xmlns:p="http://schemas.openxmlformats.org/presentationml/2006/main">
   <p:cSld>
     <p:spTree>
@@ -36735,7 +37162,7 @@
           <a:p>
             <a:fld id="{48F63A3B-78C7-47BE-AE5E-E10140E04643}" type="slidenum">
               <a:rPr lang="en-US" smtClean="0"/>
-              <a:t>27</a:t>
+              <a:t>29</a:t>
             </a:fld>
             <a:endParaRPr lang="en-US" dirty="0"/>
           </a:p>
@@ -36933,7 +37360,131 @@
 </p:sld>
 </file>
 
-<file path=ppt/slides/slide28.xml><?xml version="1.0" encoding="utf-8"?>
+<file path=ppt/slides/slide3.xml><?xml version="1.0" encoding="utf-8"?>
+<p:sld xmlns:a="http://schemas.openxmlformats.org/drawingml/2006/main" xmlns:r="http://schemas.openxmlformats.org/officeDocument/2006/relationships" xmlns:p="http://schemas.openxmlformats.org/presentationml/2006/main">
+  <p:cSld>
+    <p:spTree>
+      <p:nvGrpSpPr>
+        <p:cNvPr id="1" name=""/>
+        <p:cNvGrpSpPr/>
+        <p:nvPr/>
+      </p:nvGrpSpPr>
+      <p:grpSpPr>
+        <a:xfrm>
+          <a:off x="0" y="0"/>
+          <a:ext cx="0" cy="0"/>
+          <a:chOff x="0" y="0"/>
+          <a:chExt cx="0" cy="0"/>
+        </a:xfrm>
+      </p:grpSpPr>
+      <p:sp>
+        <p:nvSpPr>
+          <p:cNvPr id="7" name="Title 6">
+            <a:extLst>
+              <a:ext uri="{FF2B5EF4-FFF2-40B4-BE49-F238E27FC236}">
+                <a16:creationId xmlns:a16="http://schemas.microsoft.com/office/drawing/2014/main" id="{A2E5288E-E4C0-6195-8927-D77E232FC24C}"/>
+              </a:ext>
+            </a:extLst>
+          </p:cNvPr>
+          <p:cNvSpPr>
+            <a:spLocks noGrp="1"/>
+          </p:cNvSpPr>
+          <p:nvPr>
+            <p:ph type="title"/>
+          </p:nvPr>
+        </p:nvSpPr>
+        <p:spPr/>
+        <p:txBody>
+          <a:bodyPr/>
+          <a:lstStyle/>
+          <a:p>
+            <a:r>
+              <a:rPr lang="en-US" dirty="0"/>
+              <a:t>Imagine you have been asked to answer the question “Who am I?” in the form of 20 statements starting with the phrase “I am …” </a:t>
+            </a:r>
+            <a:br>
+              <a:rPr lang="en-US" dirty="0"/>
+            </a:br>
+            <a:endParaRPr lang="en-US" dirty="0"/>
+          </a:p>
+        </p:txBody>
+      </p:sp>
+      <p:sp>
+        <p:nvSpPr>
+          <p:cNvPr id="3" name="Slide Number Placeholder 2">
+            <a:extLst>
+              <a:ext uri="{FF2B5EF4-FFF2-40B4-BE49-F238E27FC236}">
+                <a16:creationId xmlns:a16="http://schemas.microsoft.com/office/drawing/2014/main" id="{DD6639EE-5E91-7B4C-D71B-0047F254AD59}"/>
+              </a:ext>
+            </a:extLst>
+          </p:cNvPr>
+          <p:cNvSpPr>
+            <a:spLocks noGrp="1"/>
+          </p:cNvSpPr>
+          <p:nvPr>
+            <p:ph type="sldNum" sz="quarter" idx="12"/>
+          </p:nvPr>
+        </p:nvSpPr>
+        <p:spPr/>
+        <p:txBody>
+          <a:bodyPr/>
+          <a:lstStyle/>
+          <a:p>
+            <a:fld id="{48F63A3B-78C7-47BE-AE5E-E10140E04643}" type="slidenum">
+              <a:rPr lang="en-US" smtClean="0"/>
+              <a:t>3</a:t>
+            </a:fld>
+            <a:endParaRPr lang="en-US" dirty="0"/>
+          </a:p>
+        </p:txBody>
+      </p:sp>
+      <p:sp>
+        <p:nvSpPr>
+          <p:cNvPr id="2" name="Footer Placeholder 1">
+            <a:extLst>
+              <a:ext uri="{FF2B5EF4-FFF2-40B4-BE49-F238E27FC236}">
+                <a16:creationId xmlns:a16="http://schemas.microsoft.com/office/drawing/2014/main" id="{97B6DABE-B6C6-74F2-54B4-7AEF648E2398}"/>
+              </a:ext>
+            </a:extLst>
+          </p:cNvPr>
+          <p:cNvSpPr>
+            <a:spLocks noGrp="1"/>
+          </p:cNvSpPr>
+          <p:nvPr>
+            <p:ph type="ftr" sz="quarter" idx="4294967295"/>
+          </p:nvPr>
+        </p:nvSpPr>
+        <p:spPr>
+          <a:xfrm>
+            <a:off x="0" y="457200"/>
+            <a:ext cx="3200400" cy="274638"/>
+          </a:xfrm>
+        </p:spPr>
+        <p:txBody>
+          <a:bodyPr/>
+          <a:lstStyle/>
+          <a:p>
+            <a:r>
+              <a:rPr lang="en-US" dirty="0"/>
+              <a:t>Affect Control Theory: Sentiments</a:t>
+            </a:r>
+          </a:p>
+        </p:txBody>
+      </p:sp>
+    </p:spTree>
+    <p:extLst>
+      <p:ext uri="{BB962C8B-B14F-4D97-AF65-F5344CB8AC3E}">
+        <p14:creationId xmlns:p14="http://schemas.microsoft.com/office/powerpoint/2010/main" val="3259176492"/>
+      </p:ext>
+    </p:extLst>
+  </p:cSld>
+  <p:clrMapOvr>
+    <a:masterClrMapping/>
+  </p:clrMapOvr>
+</p:sld>
+</file>
+
+<file path=ppt/slides/slide30.xml><?xml version="1.0" encoding="utf-8"?>
 <p:sld xmlns:a="http://schemas.openxmlformats.org/drawingml/2006/main" xmlns:r="http://schemas.openxmlformats.org/officeDocument/2006/relationships" xmlns:p="http://schemas.openxmlformats.org/presentationml/2006/main">
   <p:cSld>
     <p:spTree>
@@ -37058,7 +37609,7 @@
           <a:p>
             <a:fld id="{48F63A3B-78C7-47BE-AE5E-E10140E04643}" type="slidenum">
               <a:rPr lang="en-US" smtClean="0"/>
-              <a:t>28</a:t>
+              <a:t>30</a:t>
             </a:fld>
             <a:endParaRPr lang="en-US" dirty="0"/>
           </a:p>
@@ -37158,7 +37709,7 @@
 </p:sld>
 </file>
 
-<file path=ppt/slides/slide29.xml><?xml version="1.0" encoding="utf-8"?>
+<file path=ppt/slides/slide31.xml><?xml version="1.0" encoding="utf-8"?>
 <p:sld xmlns:a="http://schemas.openxmlformats.org/drawingml/2006/main" xmlns:r="http://schemas.openxmlformats.org/officeDocument/2006/relationships" xmlns:p="http://schemas.openxmlformats.org/presentationml/2006/main">
   <p:cSld>
     <p:spTree>
@@ -37283,7 +37834,7 @@
           <a:p>
             <a:fld id="{48F63A3B-78C7-47BE-AE5E-E10140E04643}" type="slidenum">
               <a:rPr lang="en-US" smtClean="0"/>
-              <a:t>29</a:t>
+              <a:t>31</a:t>
             </a:fld>
             <a:endParaRPr lang="en-US" dirty="0"/>
           </a:p>
@@ -37385,131 +37936,7 @@
 </p:sld>
 </file>
 
-<file path=ppt/slides/slide3.xml><?xml version="1.0" encoding="utf-8"?>
-<p:sld xmlns:a="http://schemas.openxmlformats.org/drawingml/2006/main" xmlns:r="http://schemas.openxmlformats.org/officeDocument/2006/relationships" xmlns:p="http://schemas.openxmlformats.org/presentationml/2006/main">
-  <p:cSld>
-    <p:spTree>
-      <p:nvGrpSpPr>
-        <p:cNvPr id="1" name=""/>
-        <p:cNvGrpSpPr/>
-        <p:nvPr/>
-      </p:nvGrpSpPr>
-      <p:grpSpPr>
-        <a:xfrm>
-          <a:off x="0" y="0"/>
-          <a:ext cx="0" cy="0"/>
-          <a:chOff x="0" y="0"/>
-          <a:chExt cx="0" cy="0"/>
-        </a:xfrm>
-      </p:grpSpPr>
-      <p:sp>
-        <p:nvSpPr>
-          <p:cNvPr id="7" name="Title 6">
-            <a:extLst>
-              <a:ext uri="{FF2B5EF4-FFF2-40B4-BE49-F238E27FC236}">
-                <a16:creationId xmlns:a16="http://schemas.microsoft.com/office/drawing/2014/main" id="{A2E5288E-E4C0-6195-8927-D77E232FC24C}"/>
-              </a:ext>
-            </a:extLst>
-          </p:cNvPr>
-          <p:cNvSpPr>
-            <a:spLocks noGrp="1"/>
-          </p:cNvSpPr>
-          <p:nvPr>
-            <p:ph type="title"/>
-          </p:nvPr>
-        </p:nvSpPr>
-        <p:spPr/>
-        <p:txBody>
-          <a:bodyPr/>
-          <a:lstStyle/>
-          <a:p>
-            <a:r>
-              <a:rPr lang="en-US" dirty="0"/>
-              <a:t>Imagine you have been asked to answer the question “Who am I?” in the form of 20 statements starting with the phrase “I am …” </a:t>
-            </a:r>
-            <a:br>
-              <a:rPr lang="en-US" dirty="0"/>
-            </a:br>
-            <a:endParaRPr lang="en-US" dirty="0"/>
-          </a:p>
-        </p:txBody>
-      </p:sp>
-      <p:sp>
-        <p:nvSpPr>
-          <p:cNvPr id="3" name="Slide Number Placeholder 2">
-            <a:extLst>
-              <a:ext uri="{FF2B5EF4-FFF2-40B4-BE49-F238E27FC236}">
-                <a16:creationId xmlns:a16="http://schemas.microsoft.com/office/drawing/2014/main" id="{DD6639EE-5E91-7B4C-D71B-0047F254AD59}"/>
-              </a:ext>
-            </a:extLst>
-          </p:cNvPr>
-          <p:cNvSpPr>
-            <a:spLocks noGrp="1"/>
-          </p:cNvSpPr>
-          <p:nvPr>
-            <p:ph type="sldNum" sz="quarter" idx="12"/>
-          </p:nvPr>
-        </p:nvSpPr>
-        <p:spPr/>
-        <p:txBody>
-          <a:bodyPr/>
-          <a:lstStyle/>
-          <a:p>
-            <a:fld id="{48F63A3B-78C7-47BE-AE5E-E10140E04643}" type="slidenum">
-              <a:rPr lang="en-US" smtClean="0"/>
-              <a:t>3</a:t>
-            </a:fld>
-            <a:endParaRPr lang="en-US" dirty="0"/>
-          </a:p>
-        </p:txBody>
-      </p:sp>
-      <p:sp>
-        <p:nvSpPr>
-          <p:cNvPr id="2" name="Footer Placeholder 1">
-            <a:extLst>
-              <a:ext uri="{FF2B5EF4-FFF2-40B4-BE49-F238E27FC236}">
-                <a16:creationId xmlns:a16="http://schemas.microsoft.com/office/drawing/2014/main" id="{97B6DABE-B6C6-74F2-54B4-7AEF648E2398}"/>
-              </a:ext>
-            </a:extLst>
-          </p:cNvPr>
-          <p:cNvSpPr>
-            <a:spLocks noGrp="1"/>
-          </p:cNvSpPr>
-          <p:nvPr>
-            <p:ph type="ftr" sz="quarter" idx="4294967295"/>
-          </p:nvPr>
-        </p:nvSpPr>
-        <p:spPr>
-          <a:xfrm>
-            <a:off x="0" y="457200"/>
-            <a:ext cx="3200400" cy="274638"/>
-          </a:xfrm>
-        </p:spPr>
-        <p:txBody>
-          <a:bodyPr/>
-          <a:lstStyle/>
-          <a:p>
-            <a:r>
-              <a:rPr lang="en-US" dirty="0"/>
-              <a:t>Affect Control Theory: Sentiments</a:t>
-            </a:r>
-          </a:p>
-        </p:txBody>
-      </p:sp>
-    </p:spTree>
-    <p:extLst>
-      <p:ext uri="{BB962C8B-B14F-4D97-AF65-F5344CB8AC3E}">
-        <p14:creationId xmlns:p14="http://schemas.microsoft.com/office/powerpoint/2010/main" val="3259176492"/>
-      </p:ext>
-    </p:extLst>
-  </p:cSld>
-  <p:clrMapOvr>
-    <a:masterClrMapping/>
-  </p:clrMapOvr>
-</p:sld>
-</file>
-
-<file path=ppt/slides/slide30.xml><?xml version="1.0" encoding="utf-8"?>
+<file path=ppt/slides/slide32.xml><?xml version="1.0" encoding="utf-8"?>
 <p:sld xmlns:a="http://schemas.openxmlformats.org/drawingml/2006/main" xmlns:r="http://schemas.openxmlformats.org/officeDocument/2006/relationships" xmlns:p="http://schemas.openxmlformats.org/presentationml/2006/main">
   <p:cSld>
     <p:spTree>
@@ -37634,7 +38061,7 @@
           <a:p>
             <a:fld id="{48F63A3B-78C7-47BE-AE5E-E10140E04643}" type="slidenum">
               <a:rPr lang="en-US" smtClean="0"/>
-              <a:t>30</a:t>
+              <a:t>32</a:t>
             </a:fld>
             <a:endParaRPr lang="en-US" dirty="0"/>
           </a:p>
@@ -37744,7 +38171,7 @@
 </p:sld>
 </file>
 
-<file path=ppt/slides/slide31.xml><?xml version="1.0" encoding="utf-8"?>
+<file path=ppt/slides/slide33.xml><?xml version="1.0" encoding="utf-8"?>
 <p:sld xmlns:a="http://schemas.openxmlformats.org/drawingml/2006/main" xmlns:r="http://schemas.openxmlformats.org/officeDocument/2006/relationships" xmlns:p="http://schemas.openxmlformats.org/presentationml/2006/main">
   <p:cSld>
     <p:spTree>
@@ -37922,7 +38349,7 @@
           <a:p>
             <a:fld id="{48F63A3B-78C7-47BE-AE5E-E10140E04643}" type="slidenum">
               <a:rPr lang="en-US" smtClean="0"/>
-              <a:t>31</a:t>
+              <a:t>33</a:t>
             </a:fld>
             <a:endParaRPr lang="en-US" dirty="0"/>
           </a:p>
@@ -37990,63 +38417,6 @@
       </p:sp>
       <p:sp>
         <p:nvSpPr>
-          <p:cNvPr id="17" name="Content Placeholder 2">
-            <a:extLst>
-              <a:ext uri="{FF2B5EF4-FFF2-40B4-BE49-F238E27FC236}">
-                <a16:creationId xmlns:a16="http://schemas.microsoft.com/office/drawing/2014/main" id="{9D49DA49-1B05-8B90-8D89-2F52883895AA}"/>
-              </a:ext>
-            </a:extLst>
-          </p:cNvPr>
-          <p:cNvSpPr>
-            <a:spLocks noGrp="1"/>
-          </p:cNvSpPr>
-          <p:nvPr>
-            <p:ph sz="half" idx="1"/>
-          </p:nvPr>
-        </p:nvSpPr>
-        <p:spPr/>
-        <p:txBody>
-          <a:bodyPr>
-            <a:normAutofit/>
-          </a:bodyPr>
-          <a:lstStyle/>
-          <a:p>
-            <a:r>
-              <a:rPr lang="en-US" dirty="0"/>
-              <a:t>A: physical characteristics or attributes </a:t>
-            </a:r>
-          </a:p>
-          <a:p>
-            <a:endParaRPr lang="en-US" dirty="0"/>
-          </a:p>
-          <a:p>
-            <a:r>
-              <a:rPr lang="en-US" dirty="0"/>
-              <a:t>B: roles or identities </a:t>
-            </a:r>
-          </a:p>
-          <a:p>
-            <a:endParaRPr lang="en-US" dirty="0"/>
-          </a:p>
-          <a:p>
-            <a:r>
-              <a:rPr lang="en-US" dirty="0"/>
-              <a:t>C: personal characteristics &amp; emotional states </a:t>
-            </a:r>
-          </a:p>
-          <a:p>
-            <a:endParaRPr lang="en-US" dirty="0"/>
-          </a:p>
-          <a:p>
-            <a:r>
-              <a:rPr lang="en-US" dirty="0"/>
-              <a:t>D: general more than specific,  existential </a:t>
-            </a:r>
-          </a:p>
-        </p:txBody>
-      </p:sp>
-      <p:sp>
-        <p:nvSpPr>
           <p:cNvPr id="4" name="Footer Placeholder 3">
             <a:extLst>
               <a:ext uri="{FF2B5EF4-FFF2-40B4-BE49-F238E27FC236}">
@@ -38116,6 +38486,305 @@
           </a:p>
         </p:txBody>
       </p:sp>
+      <p:graphicFrame>
+        <p:nvGraphicFramePr>
+          <p:cNvPr id="8" name="Table 8">
+            <a:extLst>
+              <a:ext uri="{FF2B5EF4-FFF2-40B4-BE49-F238E27FC236}">
+                <a16:creationId xmlns:a16="http://schemas.microsoft.com/office/drawing/2014/main" id="{6E19BA6D-9656-1324-9C0D-4A6AE06EC4FD}"/>
+              </a:ext>
+            </a:extLst>
+          </p:cNvPr>
+          <p:cNvGraphicFramePr>
+            <a:graphicFrameLocks noGrp="1"/>
+          </p:cNvGraphicFramePr>
+          <p:nvPr>
+            <p:extLst>
+              <p:ext uri="{D42A27DB-BD31-4B8C-83A1-F6EECF244321}">
+                <p14:modId xmlns:p14="http://schemas.microsoft.com/office/powerpoint/2010/main" val="3665780338"/>
+              </p:ext>
+            </p:extLst>
+          </p:nvPr>
+        </p:nvGraphicFramePr>
+        <p:xfrm>
+          <a:off x="2030476" y="2717800"/>
+          <a:ext cx="8127999" cy="3205480"/>
+        </p:xfrm>
+        <a:graphic>
+          <a:graphicData uri="http://schemas.openxmlformats.org/drawingml/2006/table">
+            <a:tbl>
+              <a:tblPr firstRow="1" bandRow="1">
+                <a:tableStyleId>{21E4AEA4-8DFA-4A89-87EB-49C32662AFE0}</a:tableStyleId>
+              </a:tblPr>
+              <a:tblGrid>
+                <a:gridCol w="2709333">
+                  <a:extLst>
+                    <a:ext uri="{9D8B030D-6E8A-4147-A177-3AD203B41FA5}">
+                      <a16:colId xmlns:a16="http://schemas.microsoft.com/office/drawing/2014/main" val="95063580"/>
+                    </a:ext>
+                  </a:extLst>
+                </a:gridCol>
+                <a:gridCol w="2709333">
+                  <a:extLst>
+                    <a:ext uri="{9D8B030D-6E8A-4147-A177-3AD203B41FA5}">
+                      <a16:colId xmlns:a16="http://schemas.microsoft.com/office/drawing/2014/main" val="1541482647"/>
+                    </a:ext>
+                  </a:extLst>
+                </a:gridCol>
+                <a:gridCol w="2709333">
+                  <a:extLst>
+                    <a:ext uri="{9D8B030D-6E8A-4147-A177-3AD203B41FA5}">
+                      <a16:colId xmlns:a16="http://schemas.microsoft.com/office/drawing/2014/main" val="3350777575"/>
+                    </a:ext>
+                  </a:extLst>
+                </a:gridCol>
+              </a:tblGrid>
+              <a:tr h="370840">
+                <a:tc>
+                  <a:txBody>
+                    <a:bodyPr/>
+                    <a:lstStyle/>
+                    <a:p>
+                      <a:r>
+                        <a:rPr lang="en-US" dirty="0"/>
+                        <a:t>Code</a:t>
+                      </a:r>
+                    </a:p>
+                  </a:txBody>
+                  <a:tcPr/>
+                </a:tc>
+                <a:tc>
+                  <a:txBody>
+                    <a:bodyPr/>
+                    <a:lstStyle/>
+                    <a:p>
+                      <a:r>
+                        <a:rPr lang="en-US" dirty="0"/>
+                        <a:t>Description</a:t>
+                      </a:r>
+                    </a:p>
+                  </a:txBody>
+                  <a:tcPr/>
+                </a:tc>
+                <a:tc>
+                  <a:txBody>
+                    <a:bodyPr/>
+                    <a:lstStyle/>
+                    <a:p>
+                      <a:r>
+                        <a:rPr lang="en-US" dirty="0"/>
+                        <a:t>Example</a:t>
+                      </a:r>
+                    </a:p>
+                  </a:txBody>
+                  <a:tcPr/>
+                </a:tc>
+                <a:extLst>
+                  <a:ext uri="{0D108BD9-81ED-4DB2-BD59-A6C34878D82A}">
+                    <a16:rowId xmlns:a16="http://schemas.microsoft.com/office/drawing/2014/main" val="1614460241"/>
+                  </a:ext>
+                </a:extLst>
+              </a:tr>
+              <a:tr h="370840">
+                <a:tc>
+                  <a:txBody>
+                    <a:bodyPr/>
+                    <a:lstStyle/>
+                    <a:p>
+                      <a:r>
+                        <a:rPr lang="en-US" dirty="0"/>
+                        <a:t>A</a:t>
+                      </a:r>
+                    </a:p>
+                  </a:txBody>
+                  <a:tcPr/>
+                </a:tc>
+                <a:tc>
+                  <a:txBody>
+                    <a:bodyPr/>
+                    <a:lstStyle/>
+                    <a:p>
+                      <a:r>
+                        <a:rPr lang="en-US" dirty="0"/>
+                        <a:t>Physical characteristics/attributes</a:t>
+                      </a:r>
+                    </a:p>
+                  </a:txBody>
+                  <a:tcPr/>
+                </a:tc>
+                <a:tc>
+                  <a:txBody>
+                    <a:bodyPr/>
+                    <a:lstStyle/>
+                    <a:p>
+                      <a:r>
+                        <a:rPr lang="en-US" dirty="0"/>
+                        <a:t>I am short</a:t>
+                      </a:r>
+                    </a:p>
+                  </a:txBody>
+                  <a:tcPr/>
+                </a:tc>
+                <a:extLst>
+                  <a:ext uri="{0D108BD9-81ED-4DB2-BD59-A6C34878D82A}">
+                    <a16:rowId xmlns:a16="http://schemas.microsoft.com/office/drawing/2014/main" val="3144496737"/>
+                  </a:ext>
+                </a:extLst>
+              </a:tr>
+              <a:tr h="370840">
+                <a:tc>
+                  <a:txBody>
+                    <a:bodyPr/>
+                    <a:lstStyle/>
+                    <a:p>
+                      <a:r>
+                        <a:rPr lang="en-US" dirty="0"/>
+                        <a:t>B</a:t>
+                      </a:r>
+                    </a:p>
+                  </a:txBody>
+                  <a:tcPr/>
+                </a:tc>
+                <a:tc>
+                  <a:txBody>
+                    <a:bodyPr/>
+                    <a:lstStyle/>
+                    <a:p>
+                      <a:r>
+                        <a:rPr lang="en-US" dirty="0"/>
+                        <a:t>Roles, group memberships</a:t>
+                      </a:r>
+                    </a:p>
+                  </a:txBody>
+                  <a:tcPr/>
+                </a:tc>
+                <a:tc>
+                  <a:txBody>
+                    <a:bodyPr/>
+                    <a:lstStyle/>
+                    <a:p>
+                      <a:r>
+                        <a:rPr lang="en-US" dirty="0"/>
+                        <a:t>I am a grad student. </a:t>
+                      </a:r>
+                    </a:p>
+                    <a:p>
+                      <a:r>
+                        <a:rPr lang="en-US" dirty="0"/>
+                        <a:t>I am a Duke student.</a:t>
+                      </a:r>
+                    </a:p>
+                    <a:p>
+                      <a:r>
+                        <a:rPr lang="en-US" dirty="0"/>
+                        <a:t>I am a friend.</a:t>
+                      </a:r>
+                    </a:p>
+                  </a:txBody>
+                  <a:tcPr/>
+                </a:tc>
+                <a:extLst>
+                  <a:ext uri="{0D108BD9-81ED-4DB2-BD59-A6C34878D82A}">
+                    <a16:rowId xmlns:a16="http://schemas.microsoft.com/office/drawing/2014/main" val="555568295"/>
+                  </a:ext>
+                </a:extLst>
+              </a:tr>
+              <a:tr h="370840">
+                <a:tc>
+                  <a:txBody>
+                    <a:bodyPr/>
+                    <a:lstStyle/>
+                    <a:p>
+                      <a:r>
+                        <a:rPr lang="en-US" dirty="0"/>
+                        <a:t>C</a:t>
+                      </a:r>
+                    </a:p>
+                  </a:txBody>
+                  <a:tcPr/>
+                </a:tc>
+                <a:tc>
+                  <a:txBody>
+                    <a:bodyPr/>
+                    <a:lstStyle/>
+                    <a:p>
+                      <a:r>
+                        <a:rPr lang="en-US" dirty="0"/>
+                        <a:t>Personal characteristics &amp; emotional states</a:t>
+                      </a:r>
+                    </a:p>
+                  </a:txBody>
+                  <a:tcPr/>
+                </a:tc>
+                <a:tc>
+                  <a:txBody>
+                    <a:bodyPr/>
+                    <a:lstStyle/>
+                    <a:p>
+                      <a:r>
+                        <a:rPr lang="en-US" dirty="0"/>
+                        <a:t>I am compassionate.</a:t>
+                      </a:r>
+                    </a:p>
+                  </a:txBody>
+                  <a:tcPr/>
+                </a:tc>
+                <a:extLst>
+                  <a:ext uri="{0D108BD9-81ED-4DB2-BD59-A6C34878D82A}">
+                    <a16:rowId xmlns:a16="http://schemas.microsoft.com/office/drawing/2014/main" val="3096944559"/>
+                  </a:ext>
+                </a:extLst>
+              </a:tr>
+              <a:tr h="370840">
+                <a:tc>
+                  <a:txBody>
+                    <a:bodyPr/>
+                    <a:lstStyle/>
+                    <a:p>
+                      <a:r>
+                        <a:rPr lang="en-US" dirty="0"/>
+                        <a:t>D</a:t>
+                      </a:r>
+                    </a:p>
+                  </a:txBody>
+                  <a:tcPr/>
+                </a:tc>
+                <a:tc>
+                  <a:txBody>
+                    <a:bodyPr/>
+                    <a:lstStyle/>
+                    <a:p>
+                      <a:r>
+                        <a:rPr lang="en-US" dirty="0"/>
+                        <a:t>General more than specific, existential</a:t>
+                      </a:r>
+                    </a:p>
+                  </a:txBody>
+                  <a:tcPr/>
+                </a:tc>
+                <a:tc>
+                  <a:txBody>
+                    <a:bodyPr/>
+                    <a:lstStyle/>
+                    <a:p>
+                      <a:r>
+                        <a:rPr lang="en-US" dirty="0"/>
+                        <a:t>I am a human. </a:t>
+                      </a:r>
+                    </a:p>
+                  </a:txBody>
+                  <a:tcPr/>
+                </a:tc>
+                <a:extLst>
+                  <a:ext uri="{0D108BD9-81ED-4DB2-BD59-A6C34878D82A}">
+                    <a16:rowId xmlns:a16="http://schemas.microsoft.com/office/drawing/2014/main" val="242919276"/>
+                  </a:ext>
+                </a:extLst>
+              </a:tr>
+            </a:tbl>
+          </a:graphicData>
+        </a:graphic>
+      </p:graphicFrame>
     </p:spTree>
     <p:extLst>
       <p:ext uri="{BB962C8B-B14F-4D97-AF65-F5344CB8AC3E}">
@@ -38130,6 +38799,355 @@
 </file>
 
 <file path=ppt/slides/slide5.xml><?xml version="1.0" encoding="utf-8"?>
+<p:sld xmlns:a="http://schemas.openxmlformats.org/drawingml/2006/main" xmlns:r="http://schemas.openxmlformats.org/officeDocument/2006/relationships" xmlns:p="http://schemas.openxmlformats.org/presentationml/2006/main">
+  <p:cSld>
+    <p:spTree>
+      <p:nvGrpSpPr>
+        <p:cNvPr id="1" name=""/>
+        <p:cNvGrpSpPr/>
+        <p:nvPr/>
+      </p:nvGrpSpPr>
+      <p:grpSpPr>
+        <a:xfrm>
+          <a:off x="0" y="0"/>
+          <a:ext cx="0" cy="0"/>
+          <a:chOff x="0" y="0"/>
+          <a:chExt cx="0" cy="0"/>
+        </a:xfrm>
+      </p:grpSpPr>
+      <p:sp>
+        <p:nvSpPr>
+          <p:cNvPr id="2" name="Title 1">
+            <a:extLst>
+              <a:ext uri="{FF2B5EF4-FFF2-40B4-BE49-F238E27FC236}">
+                <a16:creationId xmlns:a16="http://schemas.microsoft.com/office/drawing/2014/main" id="{407AB0DA-8E9F-17F1-E072-D6581A1110E5}"/>
+              </a:ext>
+            </a:extLst>
+          </p:cNvPr>
+          <p:cNvSpPr>
+            <a:spLocks noGrp="1"/>
+          </p:cNvSpPr>
+          <p:nvPr>
+            <p:ph type="title"/>
+          </p:nvPr>
+        </p:nvSpPr>
+        <p:spPr/>
+        <p:txBody>
+          <a:bodyPr/>
+          <a:lstStyle/>
+          <a:p>
+            <a:r>
+              <a:rPr lang="en-US" dirty="0"/>
+              <a:t>Discussion</a:t>
+            </a:r>
+          </a:p>
+        </p:txBody>
+      </p:sp>
+      <p:sp>
+        <p:nvSpPr>
+          <p:cNvPr id="3" name="Content Placeholder 2">
+            <a:extLst>
+              <a:ext uri="{FF2B5EF4-FFF2-40B4-BE49-F238E27FC236}">
+                <a16:creationId xmlns:a16="http://schemas.microsoft.com/office/drawing/2014/main" id="{62C8170C-CAE7-472E-4B9D-827055109D99}"/>
+              </a:ext>
+            </a:extLst>
+          </p:cNvPr>
+          <p:cNvSpPr>
+            <a:spLocks noGrp="1"/>
+          </p:cNvSpPr>
+          <p:nvPr>
+            <p:ph sz="half" idx="1"/>
+          </p:nvPr>
+        </p:nvSpPr>
+        <p:spPr/>
+        <p:txBody>
+          <a:bodyPr/>
+          <a:lstStyle/>
+          <a:p>
+            <a:r>
+              <a:rPr lang="en-US" dirty="0"/>
+              <a:t>Count up the number of statements that fall into each category </a:t>
+            </a:r>
+          </a:p>
+          <a:p>
+            <a:endParaRPr lang="en-US" dirty="0"/>
+          </a:p>
+          <a:p>
+            <a:r>
+              <a:rPr lang="en-US" dirty="0"/>
+              <a:t>Report your summary </a:t>
+            </a:r>
+            <a:r>
+              <a:rPr lang="en-US" b="1" dirty="0"/>
+              <a:t>here: </a:t>
+            </a:r>
+            <a:r>
+              <a:rPr lang="en-US" b="1" dirty="0">
+                <a:hlinkClick r:id="rId2"/>
+              </a:rPr>
+              <a:t>https://forms.gle/FidxJcw2frzNdFay7</a:t>
+            </a:r>
+            <a:r>
+              <a:rPr lang="en-US" b="1" dirty="0"/>
+              <a:t> </a:t>
+            </a:r>
+          </a:p>
+          <a:p>
+            <a:endParaRPr lang="en-US" b="1" dirty="0"/>
+          </a:p>
+          <a:p>
+            <a:r>
+              <a:rPr lang="en-US" b="1" dirty="0"/>
+              <a:t>In a small group – 2-3 people, discuss your breakdown – how similar were you in terms of how many A, B, C and D statements you had? </a:t>
+            </a:r>
+          </a:p>
+          <a:p>
+            <a:endParaRPr lang="en-US" b="1" dirty="0"/>
+          </a:p>
+          <a:p>
+            <a:r>
+              <a:rPr lang="en-US" dirty="0"/>
+              <a:t>If there are any differences, can you guess as to why? </a:t>
+            </a:r>
+          </a:p>
+          <a:p>
+            <a:endParaRPr lang="en-US" dirty="0"/>
+          </a:p>
+        </p:txBody>
+      </p:sp>
+      <p:sp>
+        <p:nvSpPr>
+          <p:cNvPr id="4" name="Footer Placeholder 3">
+            <a:extLst>
+              <a:ext uri="{FF2B5EF4-FFF2-40B4-BE49-F238E27FC236}">
+                <a16:creationId xmlns:a16="http://schemas.microsoft.com/office/drawing/2014/main" id="{69927E92-6E19-8E9B-C80B-F59D3E308F79}"/>
+              </a:ext>
+            </a:extLst>
+          </p:cNvPr>
+          <p:cNvSpPr>
+            <a:spLocks noGrp="1"/>
+          </p:cNvSpPr>
+          <p:nvPr>
+            <p:ph type="ftr" sz="quarter" idx="11"/>
+          </p:nvPr>
+        </p:nvSpPr>
+        <p:spPr/>
+        <p:txBody>
+          <a:bodyPr/>
+          <a:lstStyle/>
+          <a:p>
+            <a:r>
+              <a:rPr lang="en-US" dirty="0"/>
+              <a:t>Affect Control Theory: Sentiments</a:t>
+            </a:r>
+          </a:p>
+        </p:txBody>
+      </p:sp>
+      <p:sp>
+        <p:nvSpPr>
+          <p:cNvPr id="5" name="Slide Number Placeholder 4">
+            <a:extLst>
+              <a:ext uri="{FF2B5EF4-FFF2-40B4-BE49-F238E27FC236}">
+                <a16:creationId xmlns:a16="http://schemas.microsoft.com/office/drawing/2014/main" id="{FD79AD20-2D42-15F1-7F6A-B6C3CFEE241E}"/>
+              </a:ext>
+            </a:extLst>
+          </p:cNvPr>
+          <p:cNvSpPr>
+            <a:spLocks noGrp="1"/>
+          </p:cNvSpPr>
+          <p:nvPr>
+            <p:ph type="sldNum" sz="quarter" idx="12"/>
+          </p:nvPr>
+        </p:nvSpPr>
+        <p:spPr/>
+        <p:txBody>
+          <a:bodyPr/>
+          <a:lstStyle/>
+          <a:p>
+            <a:fld id="{48F63A3B-78C7-47BE-AE5E-E10140E04643}" type="slidenum">
+              <a:rPr lang="en-US" smtClean="0"/>
+              <a:t>5</a:t>
+            </a:fld>
+            <a:endParaRPr lang="en-US" dirty="0"/>
+          </a:p>
+        </p:txBody>
+      </p:sp>
+    </p:spTree>
+    <p:extLst>
+      <p:ext uri="{BB962C8B-B14F-4D97-AF65-F5344CB8AC3E}">
+        <p14:creationId xmlns:p14="http://schemas.microsoft.com/office/powerpoint/2010/main" val="1004294491"/>
+      </p:ext>
+    </p:extLst>
+  </p:cSld>
+  <p:clrMapOvr>
+    <a:masterClrMapping/>
+  </p:clrMapOvr>
+</p:sld>
+</file>
+
+<file path=ppt/slides/slide6.xml><?xml version="1.0" encoding="utf-8"?>
+<p:sld xmlns:a="http://schemas.openxmlformats.org/drawingml/2006/main" xmlns:r="http://schemas.openxmlformats.org/officeDocument/2006/relationships" xmlns:p="http://schemas.openxmlformats.org/presentationml/2006/main">
+  <p:cSld>
+    <p:spTree>
+      <p:nvGrpSpPr>
+        <p:cNvPr id="1" name=""/>
+        <p:cNvGrpSpPr/>
+        <p:nvPr/>
+      </p:nvGrpSpPr>
+      <p:grpSpPr>
+        <a:xfrm>
+          <a:off x="0" y="0"/>
+          <a:ext cx="0" cy="0"/>
+          <a:chOff x="0" y="0"/>
+          <a:chExt cx="0" cy="0"/>
+        </a:xfrm>
+      </p:grpSpPr>
+      <p:sp>
+        <p:nvSpPr>
+          <p:cNvPr id="10" name="Title 9">
+            <a:extLst>
+              <a:ext uri="{FF2B5EF4-FFF2-40B4-BE49-F238E27FC236}">
+                <a16:creationId xmlns:a16="http://schemas.microsoft.com/office/drawing/2014/main" id="{8974C46D-30A5-143A-EE2E-BF80431CA348}"/>
+              </a:ext>
+            </a:extLst>
+          </p:cNvPr>
+          <p:cNvSpPr>
+            <a:spLocks noGrp="1"/>
+          </p:cNvSpPr>
+          <p:nvPr>
+            <p:ph type="title"/>
+          </p:nvPr>
+        </p:nvSpPr>
+        <p:spPr/>
+        <p:txBody>
+          <a:bodyPr/>
+          <a:lstStyle/>
+          <a:p>
+            <a:r>
+              <a:rPr lang="en-US" dirty="0"/>
+              <a:t>Identities are the interface between the self and society</a:t>
+            </a:r>
+          </a:p>
+        </p:txBody>
+      </p:sp>
+      <p:sp>
+        <p:nvSpPr>
+          <p:cNvPr id="12" name="Text Placeholder 11">
+            <a:extLst>
+              <a:ext uri="{FF2B5EF4-FFF2-40B4-BE49-F238E27FC236}">
+                <a16:creationId xmlns:a16="http://schemas.microsoft.com/office/drawing/2014/main" id="{500AA820-B0BE-223C-6E29-6940073C556D}"/>
+              </a:ext>
+            </a:extLst>
+          </p:cNvPr>
+          <p:cNvSpPr>
+            <a:spLocks noGrp="1"/>
+          </p:cNvSpPr>
+          <p:nvPr>
+            <p:ph type="body" sz="quarter" idx="15"/>
+          </p:nvPr>
+        </p:nvSpPr>
+        <p:spPr/>
+        <p:txBody>
+          <a:bodyPr/>
+          <a:lstStyle/>
+          <a:p>
+            <a:endParaRPr lang="en-US" dirty="0"/>
+          </a:p>
+        </p:txBody>
+      </p:sp>
+      <p:sp>
+        <p:nvSpPr>
+          <p:cNvPr id="9" name="Content Placeholder 8">
+            <a:extLst>
+              <a:ext uri="{FF2B5EF4-FFF2-40B4-BE49-F238E27FC236}">
+                <a16:creationId xmlns:a16="http://schemas.microsoft.com/office/drawing/2014/main" id="{51CA91F0-15DB-53EC-4DB8-39F88EC5B93A}"/>
+              </a:ext>
+            </a:extLst>
+          </p:cNvPr>
+          <p:cNvSpPr>
+            <a:spLocks noGrp="1"/>
+          </p:cNvSpPr>
+          <p:nvPr>
+            <p:ph type="body" sz="quarter" idx="13"/>
+          </p:nvPr>
+        </p:nvSpPr>
+        <p:spPr/>
+        <p:txBody>
+          <a:bodyPr/>
+          <a:lstStyle/>
+          <a:p>
+            <a:endParaRPr lang="en-US" dirty="0"/>
+          </a:p>
+        </p:txBody>
+      </p:sp>
+      <p:sp>
+        <p:nvSpPr>
+          <p:cNvPr id="11" name="Text Placeholder 10">
+            <a:extLst>
+              <a:ext uri="{FF2B5EF4-FFF2-40B4-BE49-F238E27FC236}">
+                <a16:creationId xmlns:a16="http://schemas.microsoft.com/office/drawing/2014/main" id="{A1D30720-409B-32F3-7306-F884C7C37E4E}"/>
+              </a:ext>
+            </a:extLst>
+          </p:cNvPr>
+          <p:cNvSpPr>
+            <a:spLocks noGrp="1"/>
+          </p:cNvSpPr>
+          <p:nvPr>
+            <p:ph type="body" sz="quarter" idx="14"/>
+          </p:nvPr>
+        </p:nvSpPr>
+        <p:spPr/>
+        <p:txBody>
+          <a:bodyPr/>
+          <a:lstStyle/>
+          <a:p>
+            <a:endParaRPr lang="en-US" dirty="0"/>
+          </a:p>
+        </p:txBody>
+      </p:sp>
+      <p:sp>
+        <p:nvSpPr>
+          <p:cNvPr id="7" name="Slide Number Placeholder 6">
+            <a:extLst>
+              <a:ext uri="{FF2B5EF4-FFF2-40B4-BE49-F238E27FC236}">
+                <a16:creationId xmlns:a16="http://schemas.microsoft.com/office/drawing/2014/main" id="{3A425C25-EE48-B731-5196-0E17C3004F9D}"/>
+              </a:ext>
+            </a:extLst>
+          </p:cNvPr>
+          <p:cNvSpPr>
+            <a:spLocks noGrp="1"/>
+          </p:cNvSpPr>
+          <p:nvPr>
+            <p:ph type="sldNum" sz="quarter" idx="12"/>
+          </p:nvPr>
+        </p:nvSpPr>
+        <p:spPr/>
+        <p:txBody>
+          <a:bodyPr/>
+          <a:lstStyle/>
+          <a:p>
+            <a:fld id="{48F63A3B-78C7-47BE-AE5E-E10140E04643}" type="slidenum">
+              <a:rPr lang="en-US" smtClean="0"/>
+              <a:t>6</a:t>
+            </a:fld>
+            <a:endParaRPr lang="en-US" dirty="0"/>
+          </a:p>
+        </p:txBody>
+      </p:sp>
+    </p:spTree>
+    <p:extLst>
+      <p:ext uri="{BB962C8B-B14F-4D97-AF65-F5344CB8AC3E}">
+        <p14:creationId xmlns:p14="http://schemas.microsoft.com/office/powerpoint/2010/main" val="1248462113"/>
+      </p:ext>
+    </p:extLst>
+  </p:cSld>
+  <p:clrMapOvr>
+    <a:masterClrMapping/>
+  </p:clrMapOvr>
+</p:sld>
+</file>
+
+<file path=ppt/slides/slide7.xml><?xml version="1.0" encoding="utf-8"?>
 <p:sld xmlns:a="http://schemas.openxmlformats.org/drawingml/2006/main" xmlns:r="http://schemas.openxmlformats.org/officeDocument/2006/relationships" xmlns:p="http://schemas.openxmlformats.org/presentationml/2006/main">
   <p:cSld>
     <p:spTree>
@@ -38176,7 +39194,7 @@
           <a:p>
             <a:r>
               <a:rPr lang="en-US" dirty="0"/>
-              <a:t>Identities</a:t>
+              <a:t>What does that mean</a:t>
             </a:r>
           </a:p>
         </p:txBody>
@@ -38211,26 +39229,55 @@
           <a:p>
             <a:r>
               <a:rPr lang="en-US" dirty="0"/>
-              <a:t>How we define ourselves &amp; are defined by others </a:t>
+              <a:t>Self / self-concept:</a:t>
             </a:r>
           </a:p>
           <a:p>
-            <a:endParaRPr lang="en-US" dirty="0"/>
-          </a:p>
-          <a:p>
+            <a:pPr lvl="1"/>
             <a:r>
               <a:rPr lang="en-US" dirty="0"/>
-              <a:t>Shape behavioral expectations </a:t>
+              <a:t>how we define ourselves</a:t>
             </a:r>
           </a:p>
           <a:p>
-            <a:endParaRPr lang="en-US" dirty="0"/>
-          </a:p>
-          <a:p>
+            <a:pPr lvl="1"/>
             <a:r>
               <a:rPr lang="en-US" dirty="0"/>
-              <a:t>Sometimes split into: role (B category), social , person (C category) </a:t>
+              <a:t>how we feel about who we are </a:t>
             </a:r>
+          </a:p>
+          <a:p>
+            <a:r>
+              <a:rPr lang="en-US" dirty="0"/>
+              <a:t>Identities</a:t>
+            </a:r>
+          </a:p>
+          <a:p>
+            <a:pPr lvl="1"/>
+            <a:r>
+              <a:rPr lang="en-US" dirty="0"/>
+              <a:t>Roles or social positions that are </a:t>
+            </a:r>
+            <a:r>
+              <a:rPr lang="en-US" b="1" dirty="0"/>
+              <a:t>socially defined </a:t>
+            </a:r>
+            <a:r>
+              <a:rPr lang="en-US" dirty="0"/>
+              <a:t>that we can embody to try to actualize our self-concept </a:t>
+            </a:r>
+          </a:p>
+          <a:p>
+            <a:pPr marL="338328" lvl="1" indent="0">
+              <a:buNone/>
+            </a:pPr>
+            <a:endParaRPr lang="en-US" dirty="0"/>
+          </a:p>
+          <a:p>
+            <a:pPr marL="338328" lvl="1" indent="0">
+              <a:buNone/>
+            </a:pPr>
+            <a:endParaRPr lang="en-US" dirty="0"/>
           </a:p>
         </p:txBody>
       </p:sp>
@@ -38274,7 +39321,7 @@
                   <a:spcPts val="600"/>
                 </a:spcAft>
               </a:pPr>
-              <a:t>5</a:t>
+              <a:t>7</a:t>
             </a:fld>
             <a:endParaRPr lang="en-US"/>
           </a:p>
@@ -38326,7 +39373,7 @@
 </p:sld>
 </file>
 
-<file path=ppt/slides/slide6.xml><?xml version="1.0" encoding="utf-8"?>
+<file path=ppt/slides/slide8.xml><?xml version="1.0" encoding="utf-8"?>
 <p:sld xmlns:a="http://schemas.openxmlformats.org/drawingml/2006/main" xmlns:r="http://schemas.openxmlformats.org/officeDocument/2006/relationships" xmlns:p="http://schemas.openxmlformats.org/presentationml/2006/main">
   <p:cSld>
     <p:spTree>
@@ -38420,7 +39467,7 @@
 </p:sld>
 </file>
 
-<file path=ppt/slides/slide7.xml><?xml version="1.0" encoding="utf-8"?>
+<file path=ppt/slides/slide9.xml><?xml version="1.0" encoding="utf-8"?>
 <p:sld xmlns:a="http://schemas.openxmlformats.org/drawingml/2006/main" xmlns:r="http://schemas.openxmlformats.org/officeDocument/2006/relationships" xmlns:p="http://schemas.openxmlformats.org/presentationml/2006/main">
   <p:cSld>
     <p:spTree>
@@ -38579,302 +39626,6 @@
     <p:extLst>
       <p:ext uri="{BB962C8B-B14F-4D97-AF65-F5344CB8AC3E}">
         <p14:creationId xmlns:p14="http://schemas.microsoft.com/office/powerpoint/2010/main" val="176598520"/>
-      </p:ext>
-    </p:extLst>
-  </p:cSld>
-  <p:clrMapOvr>
-    <a:masterClrMapping/>
-  </p:clrMapOvr>
-</p:sld>
-</file>
-
-<file path=ppt/slides/slide8.xml><?xml version="1.0" encoding="utf-8"?>
-<p:sld xmlns:a="http://schemas.openxmlformats.org/drawingml/2006/main" xmlns:r="http://schemas.openxmlformats.org/officeDocument/2006/relationships" xmlns:p="http://schemas.openxmlformats.org/presentationml/2006/main">
-  <p:cSld>
-    <p:spTree>
-      <p:nvGrpSpPr>
-        <p:cNvPr id="1" name=""/>
-        <p:cNvGrpSpPr/>
-        <p:nvPr/>
-      </p:nvGrpSpPr>
-      <p:grpSpPr>
-        <a:xfrm>
-          <a:off x="0" y="0"/>
-          <a:ext cx="0" cy="0"/>
-          <a:chOff x="0" y="0"/>
-          <a:chExt cx="0" cy="0"/>
-        </a:xfrm>
-      </p:grpSpPr>
-      <p:sp>
-        <p:nvSpPr>
-          <p:cNvPr id="4" name="Title 3">
-            <a:extLst>
-              <a:ext uri="{FF2B5EF4-FFF2-40B4-BE49-F238E27FC236}">
-                <a16:creationId xmlns:a16="http://schemas.microsoft.com/office/drawing/2014/main" id="{72E69214-67DA-08BF-FF1B-366786C63065}"/>
-              </a:ext>
-            </a:extLst>
-          </p:cNvPr>
-          <p:cNvSpPr>
-            <a:spLocks noGrp="1"/>
-          </p:cNvSpPr>
-          <p:nvPr>
-            <p:ph type="title"/>
-          </p:nvPr>
-        </p:nvSpPr>
-        <p:spPr/>
-        <p:txBody>
-          <a:bodyPr/>
-          <a:lstStyle/>
-          <a:p>
-            <a:r>
-              <a:rPr lang="en-US" dirty="0"/>
-              <a:t>Charles Osgood </a:t>
-            </a:r>
-            <a:br>
-              <a:rPr lang="en-US" dirty="0"/>
-            </a:br>
-            <a:r>
-              <a:rPr lang="en-US" dirty="0"/>
-              <a:t>Semantic Differentials</a:t>
-            </a:r>
-          </a:p>
-        </p:txBody>
-      </p:sp>
-      <p:pic>
-        <p:nvPicPr>
-          <p:cNvPr id="1026" name="Picture 2" descr="Semantic differential(어의차이척도법, 의미척도법)">
-            <a:extLst>
-              <a:ext uri="{FF2B5EF4-FFF2-40B4-BE49-F238E27FC236}">
-                <a16:creationId xmlns:a16="http://schemas.microsoft.com/office/drawing/2014/main" id="{5A7D0992-5725-7052-F221-2B6AD787BA03}"/>
-              </a:ext>
-            </a:extLst>
-          </p:cNvPr>
-          <p:cNvPicPr>
-            <a:picLocks noGrp="1" noChangeAspect="1" noChangeArrowheads="1"/>
-          </p:cNvPicPr>
-          <p:nvPr>
-            <p:ph sz="half" idx="1"/>
-          </p:nvPr>
-        </p:nvPicPr>
-        <p:blipFill>
-          <a:blip r:embed="rId3">
-            <a:extLst>
-              <a:ext uri="{28A0092B-C50C-407E-A947-70E740481C1C}">
-                <a14:useLocalDpi xmlns:a14="http://schemas.microsoft.com/office/drawing/2010/main" val="0"/>
-              </a:ext>
-            </a:extLst>
-          </a:blip>
-          <a:srcRect/>
-          <a:stretch>
-            <a:fillRect/>
-          </a:stretch>
-        </p:blipFill>
-        <p:spPr bwMode="auto">
-          <a:xfrm>
-            <a:off x="4457700" y="2913172"/>
-            <a:ext cx="3193999" cy="3416191"/>
-          </a:xfrm>
-          <a:prstGeom prst="rect">
-            <a:avLst/>
-          </a:prstGeom>
-          <a:noFill/>
-          <a:extLst>
-            <a:ext uri="{909E8E84-426E-40DD-AFC4-6F175D3DCCD1}">
-              <a14:hiddenFill xmlns:a14="http://schemas.microsoft.com/office/drawing/2010/main">
-                <a:solidFill>
-                  <a:srgbClr val="FFFFFF"/>
-                </a:solidFill>
-              </a14:hiddenFill>
-            </a:ext>
-          </a:extLst>
-        </p:spPr>
-      </p:pic>
-    </p:spTree>
-    <p:extLst>
-      <p:ext uri="{BB962C8B-B14F-4D97-AF65-F5344CB8AC3E}">
-        <p14:creationId xmlns:p14="http://schemas.microsoft.com/office/powerpoint/2010/main" val="1654984753"/>
-      </p:ext>
-    </p:extLst>
-  </p:cSld>
-  <p:clrMapOvr>
-    <a:masterClrMapping/>
-  </p:clrMapOvr>
-</p:sld>
-</file>
-
-<file path=ppt/slides/slide9.xml><?xml version="1.0" encoding="utf-8"?>
-<p:sld xmlns:a="http://schemas.openxmlformats.org/drawingml/2006/main" xmlns:r="http://schemas.openxmlformats.org/officeDocument/2006/relationships" xmlns:p="http://schemas.openxmlformats.org/presentationml/2006/main">
-  <p:cSld>
-    <p:spTree>
-      <p:nvGrpSpPr>
-        <p:cNvPr id="1" name=""/>
-        <p:cNvGrpSpPr/>
-        <p:nvPr/>
-      </p:nvGrpSpPr>
-      <p:grpSpPr>
-        <a:xfrm>
-          <a:off x="0" y="0"/>
-          <a:ext cx="0" cy="0"/>
-          <a:chOff x="0" y="0"/>
-          <a:chExt cx="0" cy="0"/>
-        </a:xfrm>
-      </p:grpSpPr>
-      <p:sp>
-        <p:nvSpPr>
-          <p:cNvPr id="6" name="Title 5">
-            <a:extLst>
-              <a:ext uri="{FF2B5EF4-FFF2-40B4-BE49-F238E27FC236}">
-                <a16:creationId xmlns:a16="http://schemas.microsoft.com/office/drawing/2014/main" id="{003198B1-54BB-06D0-A959-E34200185E31}"/>
-              </a:ext>
-            </a:extLst>
-          </p:cNvPr>
-          <p:cNvSpPr>
-            <a:spLocks noGrp="1"/>
-          </p:cNvSpPr>
-          <p:nvPr>
-            <p:ph type="title"/>
-          </p:nvPr>
-        </p:nvSpPr>
-        <p:spPr>
-          <a:xfrm>
-            <a:off x="758952" y="1216152"/>
-            <a:ext cx="10671048" cy="768096"/>
-          </a:xfrm>
-        </p:spPr>
-        <p:txBody>
-          <a:bodyPr anchor="t">
-            <a:normAutofit/>
-          </a:bodyPr>
-          <a:lstStyle/>
-          <a:p>
-            <a:r>
-              <a:rPr lang="en-US" dirty="0"/>
-              <a:t>Measuring Meaning</a:t>
-            </a:r>
-          </a:p>
-        </p:txBody>
-      </p:sp>
-      <p:sp>
-        <p:nvSpPr>
-          <p:cNvPr id="4" name="Footer Placeholder 3">
-            <a:extLst>
-              <a:ext uri="{FF2B5EF4-FFF2-40B4-BE49-F238E27FC236}">
-                <a16:creationId xmlns:a16="http://schemas.microsoft.com/office/drawing/2014/main" id="{064C92B0-7E52-5F3D-2CB5-65C78F3CA34A}"/>
-              </a:ext>
-            </a:extLst>
-          </p:cNvPr>
-          <p:cNvSpPr>
-            <a:spLocks noGrp="1"/>
-          </p:cNvSpPr>
-          <p:nvPr>
-            <p:ph type="ftr" sz="quarter" idx="11"/>
-          </p:nvPr>
-        </p:nvSpPr>
-        <p:spPr>
-          <a:xfrm>
-            <a:off x="621792" y="457200"/>
-            <a:ext cx="3200400" cy="274320"/>
-          </a:xfrm>
-        </p:spPr>
-        <p:txBody>
-          <a:bodyPr anchor="ctr">
-            <a:normAutofit/>
-          </a:bodyPr>
-          <a:lstStyle/>
-          <a:p>
-            <a:pPr>
-              <a:spcAft>
-                <a:spcPts val="600"/>
-              </a:spcAft>
-            </a:pPr>
-            <a:r>
-              <a:rPr lang="en-US" dirty="0"/>
-              <a:t>Affect Control Theory: Sentiments</a:t>
-            </a:r>
-          </a:p>
-        </p:txBody>
-      </p:sp>
-      <p:sp>
-        <p:nvSpPr>
-          <p:cNvPr id="5" name="Slide Number Placeholder 4">
-            <a:extLst>
-              <a:ext uri="{FF2B5EF4-FFF2-40B4-BE49-F238E27FC236}">
-                <a16:creationId xmlns:a16="http://schemas.microsoft.com/office/drawing/2014/main" id="{855AD2D8-1A1B-EF6C-43CE-B6A8AFF35963}"/>
-              </a:ext>
-            </a:extLst>
-          </p:cNvPr>
-          <p:cNvSpPr>
-            <a:spLocks noGrp="1"/>
-          </p:cNvSpPr>
-          <p:nvPr>
-            <p:ph type="sldNum" sz="quarter" idx="12"/>
-          </p:nvPr>
-        </p:nvSpPr>
-        <p:spPr>
-          <a:xfrm>
-            <a:off x="10945368" y="457200"/>
-            <a:ext cx="987552" cy="274320"/>
-          </a:xfrm>
-        </p:spPr>
-        <p:txBody>
-          <a:bodyPr anchor="ctr">
-            <a:normAutofit/>
-          </a:bodyPr>
-          <a:lstStyle/>
-          <a:p>
-            <a:pPr>
-              <a:spcAft>
-                <a:spcPts val="600"/>
-              </a:spcAft>
-            </a:pPr>
-            <a:fld id="{48F63A3B-78C7-47BE-AE5E-E10140E04643}" type="slidenum">
-              <a:rPr lang="en-US" smtClean="0"/>
-              <a:pPr>
-                <a:spcAft>
-                  <a:spcPts val="600"/>
-                </a:spcAft>
-              </a:pPr>
-              <a:t>9</a:t>
-            </a:fld>
-            <a:endParaRPr lang="en-US"/>
-          </a:p>
-        </p:txBody>
-      </p:sp>
-      <p:graphicFrame>
-        <p:nvGraphicFramePr>
-          <p:cNvPr id="9" name="Content Placeholder 6">
-            <a:extLst>
-              <a:ext uri="{FF2B5EF4-FFF2-40B4-BE49-F238E27FC236}">
-                <a16:creationId xmlns:a16="http://schemas.microsoft.com/office/drawing/2014/main" id="{7043C111-30BB-1943-610E-F121CF066942}"/>
-              </a:ext>
-            </a:extLst>
-          </p:cNvPr>
-          <p:cNvGraphicFramePr>
-            <a:graphicFrameLocks noGrp="1"/>
-          </p:cNvGraphicFramePr>
-          <p:nvPr>
-            <p:ph sz="half" idx="1"/>
-            <p:extLst>
-              <p:ext uri="{D42A27DB-BD31-4B8C-83A1-F6EECF244321}">
-                <p14:modId xmlns:p14="http://schemas.microsoft.com/office/powerpoint/2010/main" val="1186906416"/>
-              </p:ext>
-            </p:extLst>
-          </p:nvPr>
-        </p:nvGraphicFramePr>
-        <p:xfrm>
-          <a:off x="539496" y="2103120"/>
-          <a:ext cx="11119104" cy="4434840"/>
-        </p:xfrm>
-        <a:graphic>
-          <a:graphicData uri="http://schemas.openxmlformats.org/drawingml/2006/diagram">
-            <dgm:relIds xmlns:dgm="http://schemas.openxmlformats.org/drawingml/2006/diagram" xmlns:r="http://schemas.openxmlformats.org/officeDocument/2006/relationships" r:dm="rId2" r:lo="rId3" r:qs="rId4" r:cs="rId5"/>
-          </a:graphicData>
-        </a:graphic>
-      </p:graphicFrame>
-    </p:spTree>
-    <p:extLst>
-      <p:ext uri="{BB962C8B-B14F-4D97-AF65-F5344CB8AC3E}">
-        <p14:creationId xmlns:p14="http://schemas.microsoft.com/office/powerpoint/2010/main" val="4052890704"/>
       </p:ext>
     </p:extLst>
   </p:cSld>

</xml_diff>

<commit_message>
adding stuff for feb 3
</commit_message>
<xml_diff>
--- a/slides/jan_26.pptx
+++ b/slides/jan_26.pptx
@@ -5,7 +5,7 @@
     <p:sldMasterId id="2147483650" r:id="rId1"/>
   </p:sldMasterIdLst>
   <p:notesMasterIdLst>
-    <p:notesMasterId r:id="rId35"/>
+    <p:notesMasterId r:id="rId36"/>
   </p:notesMasterIdLst>
   <p:sldIdLst>
     <p:sldId id="278" r:id="rId2"/>
@@ -41,6 +41,7 @@
     <p:sldId id="320" r:id="rId32"/>
     <p:sldId id="321" r:id="rId33"/>
     <p:sldId id="322" r:id="rId34"/>
+    <p:sldId id="325" r:id="rId35"/>
   </p:sldIdLst>
   <p:sldSz cx="12192000" cy="6858000"/>
   <p:notesSz cx="13716000" cy="24384000"/>
@@ -38368,6 +38369,159 @@
 </p:sld>
 </file>
 
+<file path=ppt/slides/slide34.xml><?xml version="1.0" encoding="utf-8"?>
+<p:sld xmlns:a="http://schemas.openxmlformats.org/drawingml/2006/main" xmlns:r="http://schemas.openxmlformats.org/officeDocument/2006/relationships" xmlns:p="http://schemas.openxmlformats.org/presentationml/2006/main">
+  <p:cSld>
+    <p:spTree>
+      <p:nvGrpSpPr>
+        <p:cNvPr id="1" name=""/>
+        <p:cNvGrpSpPr/>
+        <p:nvPr/>
+      </p:nvGrpSpPr>
+      <p:grpSpPr>
+        <a:xfrm>
+          <a:off x="0" y="0"/>
+          <a:ext cx="0" cy="0"/>
+          <a:chOff x="0" y="0"/>
+          <a:chExt cx="0" cy="0"/>
+        </a:xfrm>
+      </p:grpSpPr>
+      <p:sp>
+        <p:nvSpPr>
+          <p:cNvPr id="2" name="Title 1">
+            <a:extLst>
+              <a:ext uri="{FF2B5EF4-FFF2-40B4-BE49-F238E27FC236}">
+                <a16:creationId xmlns:a16="http://schemas.microsoft.com/office/drawing/2014/main" id="{7F6962C3-FA4D-E42A-0BAC-B70B61A7200B}"/>
+              </a:ext>
+            </a:extLst>
+          </p:cNvPr>
+          <p:cNvSpPr>
+            <a:spLocks noGrp="1"/>
+          </p:cNvSpPr>
+          <p:nvPr>
+            <p:ph type="title"/>
+          </p:nvPr>
+        </p:nvSpPr>
+        <p:spPr/>
+        <p:txBody>
+          <a:bodyPr/>
+          <a:lstStyle/>
+          <a:p>
+            <a:r>
+              <a:rPr lang="en-US" dirty="0"/>
+              <a:t>Wednesday Reading updated</a:t>
+            </a:r>
+          </a:p>
+        </p:txBody>
+      </p:sp>
+      <p:sp>
+        <p:nvSpPr>
+          <p:cNvPr id="3" name="Content Placeholder 2">
+            <a:extLst>
+              <a:ext uri="{FF2B5EF4-FFF2-40B4-BE49-F238E27FC236}">
+                <a16:creationId xmlns:a16="http://schemas.microsoft.com/office/drawing/2014/main" id="{421266B5-A37B-73BB-F635-EB96324C548A}"/>
+              </a:ext>
+            </a:extLst>
+          </p:cNvPr>
+          <p:cNvSpPr>
+            <a:spLocks noGrp="1"/>
+          </p:cNvSpPr>
+          <p:nvPr>
+            <p:ph sz="half" idx="1"/>
+          </p:nvPr>
+        </p:nvSpPr>
+        <p:spPr/>
+        <p:txBody>
+          <a:bodyPr/>
+          <a:lstStyle/>
+          <a:p>
+            <a:r>
+              <a:rPr lang="en-US" sz="1800" b="1" dirty="0">
+                <a:effectLst/>
+                <a:latin typeface="GillSansMTPro"/>
+              </a:rPr>
+              <a:t>Boxed In: Beliefs about the Compatibility and Likability of Mother-Occupation and Father-Occupation Role Combinations </a:t>
+            </a:r>
+            <a:endParaRPr lang="en-US" dirty="0"/>
+          </a:p>
+          <a:p>
+            <a:pPr marL="0" indent="0">
+              <a:buNone/>
+            </a:pPr>
+            <a:endParaRPr lang="en-US" dirty="0"/>
+          </a:p>
+        </p:txBody>
+      </p:sp>
+      <p:sp>
+        <p:nvSpPr>
+          <p:cNvPr id="4" name="Footer Placeholder 3">
+            <a:extLst>
+              <a:ext uri="{FF2B5EF4-FFF2-40B4-BE49-F238E27FC236}">
+                <a16:creationId xmlns:a16="http://schemas.microsoft.com/office/drawing/2014/main" id="{49FC1C70-DDF0-BD9F-8F7E-0904805237B2}"/>
+              </a:ext>
+            </a:extLst>
+          </p:cNvPr>
+          <p:cNvSpPr>
+            <a:spLocks noGrp="1"/>
+          </p:cNvSpPr>
+          <p:nvPr>
+            <p:ph type="ftr" sz="quarter" idx="11"/>
+          </p:nvPr>
+        </p:nvSpPr>
+        <p:spPr/>
+        <p:txBody>
+          <a:bodyPr/>
+          <a:lstStyle/>
+          <a:p>
+            <a:r>
+              <a:rPr lang="en-US" dirty="0"/>
+              <a:t>Affect Control Theory: Sentiments</a:t>
+            </a:r>
+          </a:p>
+        </p:txBody>
+      </p:sp>
+      <p:sp>
+        <p:nvSpPr>
+          <p:cNvPr id="5" name="Slide Number Placeholder 4">
+            <a:extLst>
+              <a:ext uri="{FF2B5EF4-FFF2-40B4-BE49-F238E27FC236}">
+                <a16:creationId xmlns:a16="http://schemas.microsoft.com/office/drawing/2014/main" id="{66C9218B-29DB-E2A9-2C73-64BBF7FD57B2}"/>
+              </a:ext>
+            </a:extLst>
+          </p:cNvPr>
+          <p:cNvSpPr>
+            <a:spLocks noGrp="1"/>
+          </p:cNvSpPr>
+          <p:nvPr>
+            <p:ph type="sldNum" sz="quarter" idx="12"/>
+          </p:nvPr>
+        </p:nvSpPr>
+        <p:spPr/>
+        <p:txBody>
+          <a:bodyPr/>
+          <a:lstStyle/>
+          <a:p>
+            <a:fld id="{48F63A3B-78C7-47BE-AE5E-E10140E04643}" type="slidenum">
+              <a:rPr lang="en-US" smtClean="0"/>
+              <a:t>34</a:t>
+            </a:fld>
+            <a:endParaRPr lang="en-US" dirty="0"/>
+          </a:p>
+        </p:txBody>
+      </p:sp>
+    </p:spTree>
+    <p:extLst>
+      <p:ext uri="{BB962C8B-B14F-4D97-AF65-F5344CB8AC3E}">
+        <p14:creationId xmlns:p14="http://schemas.microsoft.com/office/powerpoint/2010/main" val="2072873476"/>
+      </p:ext>
+    </p:extLst>
+  </p:cSld>
+  <p:clrMapOvr>
+    <a:masterClrMapping/>
+  </p:clrMapOvr>
+</p:sld>
+</file>
+
 <file path=ppt/slides/slide4.xml><?xml version="1.0" encoding="utf-8"?>
 <p:sld xmlns:a="http://schemas.openxmlformats.org/drawingml/2006/main" xmlns:r="http://schemas.openxmlformats.org/officeDocument/2006/relationships" xmlns:p="http://schemas.openxmlformats.org/presentationml/2006/main">
   <p:cSld>

</xml_diff>